<commit_message>
Adding reporting scripts to list data owner and data curator.
</commit_message>
<xml_diff>
--- a/doc/data_hierarchy/mocha/MoCha_Data_Hierarchy.pptx
+++ b/doc/data_hierarchy/mocha/MoCha_Data_Hierarchy.pptx
@@ -197,7 +197,7 @@
           <a:p>
             <a:fld id="{8AF908A5-B5E2-E649-8094-19D8C5D1B3E3}" type="datetimeFigureOut">
               <a:rPr lang="en-US" smtClean="0"/>
-              <a:t>2/7/2022</a:t>
+              <a:t>2/16/2022</a:t>
             </a:fld>
             <a:endParaRPr lang="en-US" dirty="0"/>
           </a:p>
@@ -611,7 +611,7 @@
           <a:p>
             <a:fld id="{9181C8EF-4BEF-A44C-AE9C-F9DB6998CAEE}" type="datetimeFigureOut">
               <a:rPr lang="en-US" smtClean="0"/>
-              <a:t>2/7/2022</a:t>
+              <a:t>2/16/2022</a:t>
             </a:fld>
             <a:endParaRPr lang="en-US" dirty="0"/>
           </a:p>
@@ -809,7 +809,7 @@
           <a:p>
             <a:fld id="{9181C8EF-4BEF-A44C-AE9C-F9DB6998CAEE}" type="datetimeFigureOut">
               <a:rPr lang="en-US" smtClean="0"/>
-              <a:t>2/7/2022</a:t>
+              <a:t>2/16/2022</a:t>
             </a:fld>
             <a:endParaRPr lang="en-US" dirty="0"/>
           </a:p>
@@ -1017,7 +1017,7 @@
           <a:p>
             <a:fld id="{9181C8EF-4BEF-A44C-AE9C-F9DB6998CAEE}" type="datetimeFigureOut">
               <a:rPr lang="en-US" smtClean="0"/>
-              <a:t>2/7/2022</a:t>
+              <a:t>2/16/2022</a:t>
             </a:fld>
             <a:endParaRPr lang="en-US" dirty="0"/>
           </a:p>
@@ -1215,7 +1215,7 @@
           <a:p>
             <a:fld id="{9181C8EF-4BEF-A44C-AE9C-F9DB6998CAEE}" type="datetimeFigureOut">
               <a:rPr lang="en-US" smtClean="0"/>
-              <a:t>2/7/2022</a:t>
+              <a:t>2/16/2022</a:t>
             </a:fld>
             <a:endParaRPr lang="en-US" dirty="0"/>
           </a:p>
@@ -1490,7 +1490,7 @@
           <a:p>
             <a:fld id="{9181C8EF-4BEF-A44C-AE9C-F9DB6998CAEE}" type="datetimeFigureOut">
               <a:rPr lang="en-US" smtClean="0"/>
-              <a:t>2/7/2022</a:t>
+              <a:t>2/16/2022</a:t>
             </a:fld>
             <a:endParaRPr lang="en-US" dirty="0"/>
           </a:p>
@@ -1755,7 +1755,7 @@
           <a:p>
             <a:fld id="{9181C8EF-4BEF-A44C-AE9C-F9DB6998CAEE}" type="datetimeFigureOut">
               <a:rPr lang="en-US" smtClean="0"/>
-              <a:t>2/7/2022</a:t>
+              <a:t>2/16/2022</a:t>
             </a:fld>
             <a:endParaRPr lang="en-US" dirty="0"/>
           </a:p>
@@ -2167,7 +2167,7 @@
           <a:p>
             <a:fld id="{9181C8EF-4BEF-A44C-AE9C-F9DB6998CAEE}" type="datetimeFigureOut">
               <a:rPr lang="en-US" smtClean="0"/>
-              <a:t>2/7/2022</a:t>
+              <a:t>2/16/2022</a:t>
             </a:fld>
             <a:endParaRPr lang="en-US" dirty="0"/>
           </a:p>
@@ -2308,7 +2308,7 @@
           <a:p>
             <a:fld id="{9181C8EF-4BEF-A44C-AE9C-F9DB6998CAEE}" type="datetimeFigureOut">
               <a:rPr lang="en-US" smtClean="0"/>
-              <a:t>2/7/2022</a:t>
+              <a:t>2/16/2022</a:t>
             </a:fld>
             <a:endParaRPr lang="en-US" dirty="0"/>
           </a:p>
@@ -2421,7 +2421,7 @@
           <a:p>
             <a:fld id="{9181C8EF-4BEF-A44C-AE9C-F9DB6998CAEE}" type="datetimeFigureOut">
               <a:rPr lang="en-US" smtClean="0"/>
-              <a:t>2/7/2022</a:t>
+              <a:t>2/16/2022</a:t>
             </a:fld>
             <a:endParaRPr lang="en-US" dirty="0"/>
           </a:p>
@@ -2732,7 +2732,7 @@
           <a:p>
             <a:fld id="{9181C8EF-4BEF-A44C-AE9C-F9DB6998CAEE}" type="datetimeFigureOut">
               <a:rPr lang="en-US" smtClean="0"/>
-              <a:t>2/7/2022</a:t>
+              <a:t>2/16/2022</a:t>
             </a:fld>
             <a:endParaRPr lang="en-US" dirty="0"/>
           </a:p>
@@ -3020,7 +3020,7 @@
           <a:p>
             <a:fld id="{9181C8EF-4BEF-A44C-AE9C-F9DB6998CAEE}" type="datetimeFigureOut">
               <a:rPr lang="en-US" smtClean="0"/>
-              <a:t>2/7/2022</a:t>
+              <a:t>2/16/2022</a:t>
             </a:fld>
             <a:endParaRPr lang="en-US" dirty="0"/>
           </a:p>
@@ -3261,7 +3261,7 @@
           <a:p>
             <a:fld id="{9181C8EF-4BEF-A44C-AE9C-F9DB6998CAEE}" type="datetimeFigureOut">
               <a:rPr lang="en-US" smtClean="0"/>
-              <a:t>2/7/2022</a:t>
+              <a:t>2/16/2022</a:t>
             </a:fld>
             <a:endParaRPr lang="en-US" dirty="0"/>
           </a:p>
@@ -4641,7 +4641,7 @@
         <p:spPr>
           <a:xfrm>
             <a:off x="5966256" y="4286226"/>
-            <a:ext cx="2010392" cy="1754326"/>
+            <a:ext cx="2456384" cy="1938992"/>
           </a:xfrm>
           <a:prstGeom prst="rect">
             <a:avLst/>
@@ -4659,12 +4659,47 @@
               <a:buChar char="•"/>
             </a:pPr>
             <a:r>
+              <a:rPr lang="en-US" sz="1200" b="1" dirty="0" err="1">
+                <a:solidFill>
+                  <a:srgbClr val="FF0000"/>
+                </a:solidFill>
+              </a:rPr>
+              <a:t>assay_development_projects</a:t>
+            </a:r>
+            <a:endParaRPr lang="en-US" sz="1200" b="1" dirty="0">
+              <a:solidFill>
+                <a:srgbClr val="FF0000"/>
+              </a:solidFill>
+            </a:endParaRPr>
+          </a:p>
+          <a:p>
+            <a:pPr marL="171450" indent="-171450">
+              <a:buFont typeface="Arial" panose="020B0604020202020204" pitchFamily="34" charset="0"/>
+              <a:buChar char="•"/>
+            </a:pPr>
+            <a:r>
               <a:rPr lang="en-US" sz="1200" dirty="0" err="1">
                 <a:solidFill>
                   <a:srgbClr val="FF0000"/>
                 </a:solidFill>
               </a:rPr>
               <a:t>sample_name</a:t>
+            </a:r>
+            <a:r>
+              <a:rPr lang="en-US" sz="1200" dirty="0">
+                <a:solidFill>
+                  <a:srgbClr val="FF0000"/>
+                </a:solidFill>
+              </a:rPr>
+              <a:t>/</a:t>
+            </a:r>
+            <a:r>
+              <a:rPr lang="en-US" sz="1200" dirty="0" err="1">
+                <a:solidFill>
+                  <a:srgbClr val="FF0000"/>
+                </a:solidFill>
+              </a:rPr>
+              <a:t>sample_id</a:t>
             </a:r>
             <a:endParaRPr lang="en-US" sz="1200" dirty="0">
               <a:solidFill>
@@ -4680,10 +4715,43 @@
             <a:r>
               <a:rPr lang="en-US" sz="1200" dirty="0" err="1">
                 <a:solidFill>
-                  <a:srgbClr val="FF0000"/>
+                  <a:srgbClr val="00B050"/>
                 </a:solidFill>
               </a:rPr>
               <a:t>subject_id</a:t>
+            </a:r>
+            <a:endParaRPr lang="en-US" sz="1200" dirty="0">
+              <a:solidFill>
+                <a:srgbClr val="00B050"/>
+              </a:solidFill>
+            </a:endParaRPr>
+          </a:p>
+          <a:p>
+            <a:pPr marL="171450" indent="-171450">
+              <a:buFont typeface="Arial" panose="020B0604020202020204" pitchFamily="34" charset="0"/>
+              <a:buChar char="•"/>
+            </a:pPr>
+            <a:r>
+              <a:rPr lang="en-US" sz="1200" dirty="0">
+                <a:solidFill>
+                  <a:srgbClr val="FF0000"/>
+                </a:solidFill>
+              </a:rPr>
+              <a:t>disease</a:t>
+            </a:r>
+          </a:p>
+          <a:p>
+            <a:pPr marL="171450" indent="-171450">
+              <a:buFont typeface="Arial" panose="020B0604020202020204" pitchFamily="34" charset="0"/>
+              <a:buChar char="•"/>
+            </a:pPr>
+            <a:r>
+              <a:rPr lang="en-US" sz="1200" dirty="0" err="1">
+                <a:solidFill>
+                  <a:srgbClr val="FF0000"/>
+                </a:solidFill>
+              </a:rPr>
+              <a:t>library_strategy</a:t>
             </a:r>
             <a:endParaRPr lang="en-US" sz="1200" dirty="0">
               <a:solidFill>
@@ -4697,26 +4765,12 @@
               <a:buChar char="•"/>
             </a:pPr>
             <a:r>
-              <a:rPr lang="en-US" sz="1200" dirty="0">
+              <a:rPr lang="en-US" sz="1200" dirty="0" err="1">
                 <a:solidFill>
                   <a:srgbClr val="FF0000"/>
                 </a:solidFill>
               </a:rPr>
-              <a:t>disease</a:t>
-            </a:r>
-          </a:p>
-          <a:p>
-            <a:pPr marL="171450" indent="-171450">
-              <a:buFont typeface="Arial" panose="020B0604020202020204" pitchFamily="34" charset="0"/>
-              <a:buChar char="•"/>
-            </a:pPr>
-            <a:r>
-              <a:rPr lang="en-US" sz="1200" dirty="0" err="1">
-                <a:solidFill>
-                  <a:srgbClr val="FF0000"/>
-                </a:solidFill>
-              </a:rPr>
-              <a:t>library_strategy</a:t>
+              <a:t>analyte_type</a:t>
             </a:r>
             <a:endParaRPr lang="en-US" sz="1200" dirty="0">
               <a:solidFill>
@@ -4730,18 +4784,13 @@
               <a:buChar char="•"/>
             </a:pPr>
             <a:r>
-              <a:rPr lang="en-US" sz="1200" dirty="0" err="1">
-                <a:solidFill>
-                  <a:srgbClr val="FF0000"/>
+              <a:rPr lang="en-US" sz="1200" dirty="0">
+                <a:solidFill>
+                  <a:srgbClr val="00B050"/>
                 </a:solidFill>
               </a:rPr>
-              <a:t>analyte_type</a:t>
-            </a:r>
-            <a:endParaRPr lang="en-US" sz="1200" dirty="0">
-              <a:solidFill>
-                <a:srgbClr val="FF0000"/>
-              </a:solidFill>
-            </a:endParaRPr>
+              <a:t>tissue</a:t>
+            </a:r>
           </a:p>
           <a:p>
             <a:pPr marL="171450" indent="-171450">
@@ -4751,14 +4800,14 @@
             <a:r>
               <a:rPr lang="en-US" sz="1200" dirty="0" err="1">
                 <a:solidFill>
-                  <a:srgbClr val="FF0000"/>
+                  <a:srgbClr val="00B050"/>
                 </a:solidFill>
               </a:rPr>
-              <a:t>cell_line_name</a:t>
+              <a:t>tissue_type</a:t>
             </a:r>
             <a:endParaRPr lang="en-US" sz="1200" dirty="0">
               <a:solidFill>
-                <a:srgbClr val="FF0000"/>
+                <a:srgbClr val="00B050"/>
               </a:solidFill>
             </a:endParaRPr>
           </a:p>
@@ -4768,18 +4817,13 @@
               <a:buChar char="•"/>
             </a:pPr>
             <a:r>
-              <a:rPr lang="en-US" sz="1200" dirty="0" err="1">
-                <a:solidFill>
-                  <a:srgbClr val="FF0000"/>
+              <a:rPr lang="en-US" sz="1200" dirty="0">
+                <a:solidFill>
+                  <a:srgbClr val="00B050"/>
                 </a:solidFill>
               </a:rPr>
-              <a:t>cell_line_source</a:t>
-            </a:r>
-            <a:endParaRPr lang="en-US" sz="1200" dirty="0">
-              <a:solidFill>
-                <a:srgbClr val="FF0000"/>
-              </a:solidFill>
-            </a:endParaRPr>
+              <a:t>age</a:t>
+            </a:r>
           </a:p>
           <a:p>
             <a:pPr marL="171450" indent="-171450">
@@ -4787,31 +4831,12 @@
               <a:buChar char="•"/>
             </a:pPr>
             <a:r>
-              <a:rPr lang="en-US" sz="1200" dirty="0" err="1">
-                <a:solidFill>
-                  <a:srgbClr val="FF0000"/>
+              <a:rPr lang="en-US" sz="1200" dirty="0">
+                <a:solidFill>
+                  <a:srgbClr val="00B050"/>
                 </a:solidFill>
               </a:rPr>
-              <a:t>culture_medium</a:t>
-            </a:r>
-            <a:endParaRPr lang="en-US" sz="1200" dirty="0">
-              <a:solidFill>
-                <a:srgbClr val="FF0000"/>
-              </a:solidFill>
-            </a:endParaRPr>
-          </a:p>
-          <a:p>
-            <a:pPr marL="171450" indent="-171450">
-              <a:buFont typeface="Arial" panose="020B0604020202020204" pitchFamily="34" charset="0"/>
-              <a:buChar char="•"/>
-            </a:pPr>
-            <a:r>
-              <a:rPr lang="en-US" sz="1200" dirty="0">
-                <a:solidFill>
-                  <a:srgbClr val="FF0000"/>
-                </a:solidFill>
-              </a:rPr>
-              <a:t>genotype</a:t>
+              <a:t>gender</a:t>
             </a:r>
           </a:p>
         </p:txBody>

</xml_diff>

<commit_message>
Latest MoCha proposed data hierarchy.
</commit_message>
<xml_diff>
--- a/doc/data_hierarchy/mocha/MoCha_Data_Hierarchy.pptx
+++ b/doc/data_hierarchy/mocha/MoCha_Data_Hierarchy.pptx
@@ -8,7 +8,7 @@
     <p:notesMasterId r:id="rId3"/>
   </p:notesMasterIdLst>
   <p:sldIdLst>
-    <p:sldId id="269" r:id="rId2"/>
+    <p:sldId id="270" r:id="rId2"/>
   </p:sldIdLst>
   <p:sldSz cx="12192000" cy="6858000"/>
   <p:notesSz cx="6858000" cy="9144000"/>
@@ -115,6 +115,12 @@
 </p:presentation>
 </file>
 
+<file path=ppt/authors.xml><?xml version="1.0" encoding="utf-8"?>
+<p188:authorLst xmlns:a="http://schemas.openxmlformats.org/drawingml/2006/main" xmlns:r="http://schemas.openxmlformats.org/officeDocument/2006/relationships" xmlns:p188="http://schemas.microsoft.com/office/powerpoint/2018/8/main">
+  <p188:author id="{00000000-0000-0000-0000-000000000000}" name="Author" initials="A" userId="Author" providerId="AD"/>
+</p188:authorLst>
+</file>
+
 <file path=ppt/notesMasters/notesMaster1.xml><?xml version="1.0" encoding="utf-8"?>
 <p:notesMaster xmlns:a="http://schemas.openxmlformats.org/drawingml/2006/main" xmlns:r="http://schemas.openxmlformats.org/officeDocument/2006/relationships" xmlns:p="http://schemas.openxmlformats.org/presentationml/2006/main">
   <p:cSld>
@@ -197,7 +203,7 @@
           <a:p>
             <a:fld id="{8AF908A5-B5E2-E649-8094-19D8C5D1B3E3}" type="datetimeFigureOut">
               <a:rPr lang="en-US" smtClean="0"/>
-              <a:t>2/16/2022</a:t>
+              <a:t>4/20/2022</a:t>
             </a:fld>
             <a:endParaRPr lang="en-US" dirty="0"/>
           </a:p>
@@ -464,6 +470,486 @@
 </p:notesMaster>
 </file>
 
+<file path=ppt/notesSlides/notesSlide1.xml><?xml version="1.0" encoding="utf-8"?>
+<p:notes xmlns:a="http://schemas.openxmlformats.org/drawingml/2006/main" xmlns:r="http://schemas.openxmlformats.org/officeDocument/2006/relationships" xmlns:p="http://schemas.openxmlformats.org/presentationml/2006/main">
+  <p:cSld>
+    <p:spTree>
+      <p:nvGrpSpPr>
+        <p:cNvPr id="1" name=""/>
+        <p:cNvGrpSpPr/>
+        <p:nvPr/>
+      </p:nvGrpSpPr>
+      <p:grpSpPr>
+        <a:xfrm>
+          <a:off x="0" y="0"/>
+          <a:ext cx="0" cy="0"/>
+          <a:chOff x="0" y="0"/>
+          <a:chExt cx="0" cy="0"/>
+        </a:xfrm>
+      </p:grpSpPr>
+      <p:sp>
+        <p:nvSpPr>
+          <p:cNvPr id="2" name="Slide Image Placeholder 1"/>
+          <p:cNvSpPr>
+            <a:spLocks noGrp="1" noRot="1" noChangeAspect="1"/>
+          </p:cNvSpPr>
+          <p:nvPr>
+            <p:ph type="sldImg"/>
+          </p:nvPr>
+        </p:nvSpPr>
+        <p:spPr/>
+      </p:sp>
+      <p:sp>
+        <p:nvSpPr>
+          <p:cNvPr id="3" name="Notes Placeholder 2"/>
+          <p:cNvSpPr>
+            <a:spLocks noGrp="1"/>
+          </p:cNvSpPr>
+          <p:nvPr>
+            <p:ph type="body" idx="1"/>
+          </p:nvPr>
+        </p:nvSpPr>
+        <p:spPr/>
+        <p:txBody>
+          <a:bodyPr/>
+          <a:lstStyle/>
+          <a:p>
+            <a:pPr marL="171450" marR="0" lvl="0" indent="-171450" algn="l" defTabSz="914400" rtl="0" eaLnBrk="1" fontAlgn="auto" latinLnBrk="0" hangingPunct="1">
+              <a:lnSpc>
+                <a:spcPct val="100000"/>
+              </a:lnSpc>
+              <a:spcBef>
+                <a:spcPts val="0"/>
+              </a:spcBef>
+              <a:spcAft>
+                <a:spcPts val="0"/>
+              </a:spcAft>
+              <a:buClrTx/>
+              <a:buSzTx/>
+              <a:buFont typeface="Arial" panose="020B0604020202020204" pitchFamily="34" charset="0"/>
+              <a:buChar char="•"/>
+              <a:tabLst/>
+              <a:defRPr/>
+            </a:pPr>
+            <a:r>
+              <a:rPr lang="en-US" sz="1000" b="1" dirty="0">
+                <a:solidFill>
+                  <a:srgbClr val="FF0000"/>
+                </a:solidFill>
+              </a:rPr>
+              <a:t>library_strategy</a:t>
+            </a:r>
+            <a:r>
+              <a:rPr lang="en-US" sz="1000" b="0" dirty="0">
+                <a:solidFill>
+                  <a:srgbClr val="FF0000"/>
+                </a:solidFill>
+              </a:rPr>
+              <a:t>: </a:t>
+            </a:r>
+            <a:r>
+              <a:rPr lang="en-US" b="0" dirty="0"/>
+              <a:t>Sequencing method used for this project. </a:t>
+            </a:r>
+          </a:p>
+          <a:p>
+            <a:pPr marL="171450" marR="0" lvl="0" indent="-171450" algn="l" defTabSz="914400" rtl="0" eaLnBrk="1" fontAlgn="auto" latinLnBrk="0" hangingPunct="1">
+              <a:lnSpc>
+                <a:spcPct val="100000"/>
+              </a:lnSpc>
+              <a:spcBef>
+                <a:spcPts val="0"/>
+              </a:spcBef>
+              <a:spcAft>
+                <a:spcPts val="0"/>
+              </a:spcAft>
+              <a:buClrTx/>
+              <a:buSzTx/>
+              <a:buFont typeface="Arial" panose="020B0604020202020204" pitchFamily="34" charset="0"/>
+              <a:buChar char="•"/>
+              <a:tabLst/>
+              <a:defRPr/>
+            </a:pPr>
+            <a:r>
+              <a:rPr lang="en-US" sz="1000" b="1" dirty="0">
+                <a:solidFill>
+                  <a:srgbClr val="FF0000"/>
+                </a:solidFill>
+              </a:rPr>
+              <a:t>analyte_type</a:t>
+            </a:r>
+            <a:r>
+              <a:rPr lang="en-US" sz="1000" b="0" dirty="0">
+                <a:solidFill>
+                  <a:srgbClr val="FF0000"/>
+                </a:solidFill>
+              </a:rPr>
+              <a:t>: </a:t>
+            </a:r>
+            <a:r>
+              <a:rPr lang="en-US" sz="1200" b="0" i="0" u="none" strike="noStrike" dirty="0">
+                <a:solidFill>
+                  <a:srgbClr val="000000"/>
+                </a:solidFill>
+                <a:effectLst/>
+                <a:latin typeface="Calibri" panose="020F0502020204030204" pitchFamily="34" charset="0"/>
+              </a:rPr>
+              <a:t>The kind of molecular specimen analyte. </a:t>
+            </a:r>
+            <a:r>
+              <a:rPr lang="en-US" sz="1200" b="1" i="0" u="none" strike="noStrike" dirty="0">
+                <a:solidFill>
+                  <a:srgbClr val="000000"/>
+                </a:solidFill>
+                <a:effectLst/>
+                <a:latin typeface="Calibri" panose="020F0502020204030204" pitchFamily="34" charset="0"/>
+              </a:rPr>
+              <a:t>Valid Entry:</a:t>
+            </a:r>
+            <a:r>
+              <a:rPr lang="en-US" sz="1200" b="0" i="0" u="none" strike="noStrike" dirty="0">
+                <a:solidFill>
+                  <a:srgbClr val="000000"/>
+                </a:solidFill>
+                <a:effectLst/>
+                <a:latin typeface="Calibri" panose="020F0502020204030204" pitchFamily="34" charset="0"/>
+              </a:rPr>
+              <a:t> cfDNA, DNA, EBV Immortalized Normal, FFPE DNA, FFPE RNA, GenomePlex (Rubicon) Amplified DNA, Nuclei RNA, Repli-G (Qiagen) DNA, Repli-G Pooled (Qiagen) DNA, Repli-G X (Qiagen) DNA, RNA, Total RNA.</a:t>
+            </a:r>
+            <a:r>
+              <a:rPr lang="en-US" dirty="0"/>
+              <a:t> </a:t>
+            </a:r>
+          </a:p>
+          <a:p>
+            <a:pPr marL="171450" marR="0" lvl="0" indent="-171450" algn="l" defTabSz="914400" rtl="0" eaLnBrk="1" fontAlgn="auto" latinLnBrk="0" hangingPunct="1">
+              <a:lnSpc>
+                <a:spcPct val="100000"/>
+              </a:lnSpc>
+              <a:spcBef>
+                <a:spcPts val="0"/>
+              </a:spcBef>
+              <a:spcAft>
+                <a:spcPts val="0"/>
+              </a:spcAft>
+              <a:buClrTx/>
+              <a:buSzTx/>
+              <a:buFont typeface="Arial" panose="020B0604020202020204" pitchFamily="34" charset="0"/>
+              <a:buChar char="•"/>
+              <a:tabLst/>
+              <a:defRPr/>
+            </a:pPr>
+            <a:r>
+              <a:rPr lang="en-US" b="1" dirty="0"/>
+              <a:t>tissue</a:t>
+            </a:r>
+            <a:r>
+              <a:rPr lang="en-US" dirty="0"/>
+              <a:t>: </a:t>
+            </a:r>
+            <a:r>
+              <a:rPr lang="en-US" sz="1200" b="0" i="0" u="none" strike="noStrike" dirty="0">
+                <a:solidFill>
+                  <a:srgbClr val="000000"/>
+                </a:solidFill>
+                <a:effectLst/>
+                <a:latin typeface="Calibri" panose="020F0502020204030204" pitchFamily="34" charset="0"/>
+              </a:rPr>
+              <a:t>Name of the studied tissue or organ.</a:t>
+            </a:r>
+            <a:endParaRPr lang="en-US" dirty="0"/>
+          </a:p>
+          <a:p>
+            <a:pPr marL="171450" indent="-171450">
+              <a:buFont typeface="Arial" panose="020B0604020202020204" pitchFamily="34" charset="0"/>
+              <a:buChar char="•"/>
+            </a:pPr>
+            <a:r>
+              <a:rPr lang="en-US" b="1" dirty="0"/>
+              <a:t>tissue_type</a:t>
+            </a:r>
+            <a:r>
+              <a:rPr lang="en-US" b="0" dirty="0"/>
+              <a:t>: </a:t>
+            </a:r>
+            <a:r>
+              <a:rPr lang="en-US" sz="1200" b="0" i="0" u="none" strike="noStrike" dirty="0">
+                <a:solidFill>
+                  <a:srgbClr val="000000"/>
+                </a:solidFill>
+                <a:effectLst/>
+                <a:latin typeface="Calibri" panose="020F0502020204030204" pitchFamily="34" charset="0"/>
+              </a:rPr>
+              <a:t>The kind of tissue collected with respect to disease status or proximity to tumor tissue. Valid Entry: Tumor, Normal, Abnormal, Peritumoral</a:t>
+            </a:r>
+          </a:p>
+          <a:p>
+            <a:pPr marL="171450" indent="-171450">
+              <a:buFont typeface="Arial" panose="020B0604020202020204" pitchFamily="34" charset="0"/>
+              <a:buChar char="•"/>
+            </a:pPr>
+            <a:r>
+              <a:rPr lang="en-US" sz="1200" b="1" i="0" u="none" strike="noStrike" dirty="0">
+                <a:solidFill>
+                  <a:srgbClr val="000000"/>
+                </a:solidFill>
+                <a:effectLst/>
+                <a:latin typeface="Calibri" panose="020F0502020204030204" pitchFamily="34" charset="0"/>
+              </a:rPr>
+              <a:t>cell_line_name</a:t>
+            </a:r>
+            <a:r>
+              <a:rPr lang="en-US" sz="1200" b="0" i="0" u="none" strike="noStrike" dirty="0">
+                <a:solidFill>
+                  <a:srgbClr val="000000"/>
+                </a:solidFill>
+                <a:effectLst/>
+                <a:latin typeface="Calibri" panose="020F0502020204030204" pitchFamily="34" charset="0"/>
+              </a:rPr>
+              <a:t>:</a:t>
+            </a:r>
+            <a:r>
+              <a:rPr lang="en-US" dirty="0"/>
+              <a:t> </a:t>
+            </a:r>
+            <a:r>
+              <a:rPr lang="en-US" sz="1200" b="0" i="0" u="none" strike="noStrike" dirty="0">
+                <a:solidFill>
+                  <a:srgbClr val="000000"/>
+                </a:solidFill>
+                <a:effectLst/>
+                <a:latin typeface="Calibri" panose="020F0502020204030204" pitchFamily="34" charset="0"/>
+              </a:rPr>
+              <a:t>Cell line name or cell culture biomaterial. Use ATCC or CCLE nomenclature when possible. Refer to the official name from Cellosaurus https://web.expasy.org/cellosaurus/ </a:t>
+            </a:r>
+          </a:p>
+          <a:p>
+            <a:pPr marL="171450" indent="-171450">
+              <a:buFont typeface="Arial" panose="020B0604020202020204" pitchFamily="34" charset="0"/>
+              <a:buChar char="•"/>
+            </a:pPr>
+            <a:r>
+              <a:rPr lang="en-US" sz="1200" b="1" i="0" u="none" strike="noStrike" dirty="0">
+                <a:solidFill>
+                  <a:srgbClr val="000000"/>
+                </a:solidFill>
+                <a:effectLst/>
+                <a:latin typeface="Calibri" panose="020F0502020204030204" pitchFamily="34" charset="0"/>
+              </a:rPr>
+              <a:t>cell_line_type</a:t>
+            </a:r>
+            <a:r>
+              <a:rPr lang="en-US" sz="1200" b="0" i="0" u="none" strike="noStrike" dirty="0">
+                <a:solidFill>
+                  <a:srgbClr val="000000"/>
+                </a:solidFill>
+                <a:effectLst/>
+                <a:latin typeface="Calibri" panose="020F0502020204030204" pitchFamily="34" charset="0"/>
+              </a:rPr>
+              <a:t>:</a:t>
+            </a:r>
+            <a:r>
+              <a:rPr lang="en-US" dirty="0"/>
+              <a:t> </a:t>
+            </a:r>
+            <a:r>
+              <a:rPr lang="en-US" sz="1200" b="0" i="0" u="none" strike="noStrike" dirty="0">
+                <a:solidFill>
+                  <a:srgbClr val="000000"/>
+                </a:solidFill>
+                <a:effectLst/>
+                <a:latin typeface="Calibri" panose="020F0502020204030204" pitchFamily="34" charset="0"/>
+              </a:rPr>
+              <a:t>The type of cell line, such as Established cell line (ATCC), Primary Tumor Cells, Tumor organoids, or Transformed cells.</a:t>
+            </a:r>
+            <a:r>
+              <a:rPr lang="en-US" dirty="0"/>
+              <a:t> </a:t>
+            </a:r>
+            <a:endParaRPr lang="en-US" sz="1000" b="0" i="0" u="none" strike="noStrike" dirty="0">
+              <a:solidFill>
+                <a:schemeClr val="tx1"/>
+              </a:solidFill>
+              <a:effectLst/>
+              <a:latin typeface="+mn-lt"/>
+            </a:endParaRPr>
+          </a:p>
+          <a:p>
+            <a:pPr marL="171450" marR="0" lvl="0" indent="-171450" algn="l" defTabSz="914400" rtl="0" eaLnBrk="1" fontAlgn="auto" latinLnBrk="0" hangingPunct="1">
+              <a:lnSpc>
+                <a:spcPct val="100000"/>
+              </a:lnSpc>
+              <a:spcBef>
+                <a:spcPts val="0"/>
+              </a:spcBef>
+              <a:spcAft>
+                <a:spcPts val="0"/>
+              </a:spcAft>
+              <a:buClrTx/>
+              <a:buSzTx/>
+              <a:buFont typeface="Arial" panose="020B0604020202020204" pitchFamily="34" charset="0"/>
+              <a:buChar char="•"/>
+              <a:tabLst/>
+              <a:defRPr/>
+            </a:pPr>
+            <a:r>
+              <a:rPr lang="en-US" sz="1200" b="1" i="0" u="none" strike="noStrike" dirty="0">
+                <a:solidFill>
+                  <a:srgbClr val="000000"/>
+                </a:solidFill>
+                <a:effectLst/>
+                <a:latin typeface="Calibri" panose="020F0502020204030204" pitchFamily="34" charset="0"/>
+              </a:rPr>
+              <a:t>cell_line_source</a:t>
+            </a:r>
+            <a:r>
+              <a:rPr lang="en-US" sz="1200" b="0" i="0" u="none" strike="noStrike" dirty="0">
+                <a:solidFill>
+                  <a:srgbClr val="000000"/>
+                </a:solidFill>
+                <a:effectLst/>
+                <a:latin typeface="Calibri" panose="020F0502020204030204" pitchFamily="34" charset="0"/>
+              </a:rPr>
+              <a:t>:</a:t>
+            </a:r>
+            <a:r>
+              <a:rPr lang="en-US" sz="1200" dirty="0"/>
+              <a:t> </a:t>
+            </a:r>
+            <a:r>
+              <a:rPr lang="en-US" sz="1200" b="0" i="0" u="none" strike="noStrike" dirty="0">
+                <a:solidFill>
+                  <a:srgbClr val="000000"/>
+                </a:solidFill>
+                <a:effectLst/>
+                <a:latin typeface="Calibri" panose="020F0502020204030204" pitchFamily="34" charset="0"/>
+              </a:rPr>
+              <a:t>Source for cell line, such as patient, xenograft, third party (commercial, ATCC), lab-acquired , or mouse.</a:t>
+            </a:r>
+            <a:r>
+              <a:rPr lang="en-US" sz="1200" dirty="0"/>
+              <a:t> </a:t>
+            </a:r>
+          </a:p>
+          <a:p>
+            <a:pPr marL="171450" indent="-171450">
+              <a:buFont typeface="Arial" panose="020B0604020202020204" pitchFamily="34" charset="0"/>
+              <a:buChar char="•"/>
+            </a:pPr>
+            <a:r>
+              <a:rPr lang="en-US" sz="1200" b="1" i="0" u="none" strike="noStrike" dirty="0">
+                <a:solidFill>
+                  <a:srgbClr val="000000"/>
+                </a:solidFill>
+                <a:effectLst/>
+                <a:latin typeface="Calibri" panose="020F0502020204030204" pitchFamily="34" charset="0"/>
+              </a:rPr>
+              <a:t>culture_medium</a:t>
+            </a:r>
+            <a:r>
+              <a:rPr lang="en-US" sz="1200" b="0" i="0" u="none" strike="noStrike" dirty="0">
+                <a:solidFill>
+                  <a:srgbClr val="000000"/>
+                </a:solidFill>
+                <a:effectLst/>
+                <a:latin typeface="Calibri" panose="020F0502020204030204" pitchFamily="34" charset="0"/>
+              </a:rPr>
+              <a:t>:</a:t>
+            </a:r>
+            <a:r>
+              <a:rPr lang="en-US" dirty="0"/>
+              <a:t> </a:t>
+            </a:r>
+            <a:r>
+              <a:rPr lang="en-US" sz="1200" b="0" i="0" u="none" strike="noStrike" dirty="0">
+                <a:solidFill>
+                  <a:srgbClr val="000000"/>
+                </a:solidFill>
+                <a:effectLst/>
+                <a:latin typeface="Calibri" panose="020F0502020204030204" pitchFamily="34" charset="0"/>
+              </a:rPr>
+              <a:t>Culture medium for the cell line, specify if 3D or organoid culture.</a:t>
+            </a:r>
+            <a:r>
+              <a:rPr lang="en-US" dirty="0"/>
+              <a:t> </a:t>
+            </a:r>
+          </a:p>
+          <a:p>
+            <a:pPr marL="171450" indent="-171450">
+              <a:buFont typeface="Arial" panose="020B0604020202020204" pitchFamily="34" charset="0"/>
+              <a:buChar char="•"/>
+            </a:pPr>
+            <a:r>
+              <a:rPr lang="en-US" sz="1200" b="1" i="0" u="none" strike="noStrike" dirty="0">
+                <a:solidFill>
+                  <a:srgbClr val="000000"/>
+                </a:solidFill>
+                <a:effectLst/>
+                <a:latin typeface="Calibri" panose="020F0502020204030204" pitchFamily="34" charset="0"/>
+              </a:rPr>
+              <a:t>genotype:</a:t>
+            </a:r>
+            <a:r>
+              <a:rPr lang="en-US" dirty="0"/>
+              <a:t> </a:t>
+            </a:r>
+            <a:r>
+              <a:rPr lang="en-US" sz="1200" b="0" i="0" u="none" strike="noStrike" dirty="0">
+                <a:solidFill>
+                  <a:srgbClr val="000000"/>
+                </a:solidFill>
+                <a:effectLst/>
+                <a:latin typeface="Calibri" panose="020F0502020204030204" pitchFamily="34" charset="0"/>
+              </a:rPr>
+              <a:t>Genotype of sample, such as WT, KO, or Gene-Transfected.</a:t>
+            </a:r>
+            <a:r>
+              <a:rPr lang="en-US" dirty="0"/>
+              <a:t> </a:t>
+            </a:r>
+          </a:p>
+          <a:p>
+            <a:endParaRPr lang="en-US" dirty="0"/>
+          </a:p>
+        </p:txBody>
+      </p:sp>
+      <p:sp>
+        <p:nvSpPr>
+          <p:cNvPr id="4" name="Slide Number Placeholder 3"/>
+          <p:cNvSpPr>
+            <a:spLocks noGrp="1"/>
+          </p:cNvSpPr>
+          <p:nvPr>
+            <p:ph type="sldNum" sz="quarter" idx="5"/>
+          </p:nvPr>
+        </p:nvSpPr>
+        <p:spPr/>
+        <p:txBody>
+          <a:bodyPr/>
+          <a:lstStyle/>
+          <a:p>
+            <a:fld id="{ACB93846-3B40-734A-9437-FA3A1BFBE02E}" type="slidenum">
+              <a:rPr lang="en-US" smtClean="0"/>
+              <a:t>1</a:t>
+            </a:fld>
+            <a:endParaRPr lang="en-US" dirty="0"/>
+          </a:p>
+        </p:txBody>
+      </p:sp>
+    </p:spTree>
+    <p:extLst>
+      <p:ext uri="{BB962C8B-B14F-4D97-AF65-F5344CB8AC3E}">
+        <p14:creationId xmlns:p14="http://schemas.microsoft.com/office/powerpoint/2010/main" val="1101955192"/>
+      </p:ext>
+    </p:extLst>
+  </p:cSld>
+  <p:clrMapOvr>
+    <a:masterClrMapping/>
+  </p:clrMapOvr>
+</p:notes>
+</file>
+
 <file path=ppt/slideLayouts/slideLayout1.xml><?xml version="1.0" encoding="utf-8"?>
 <p:sldLayout xmlns:a="http://schemas.openxmlformats.org/drawingml/2006/main" xmlns:r="http://schemas.openxmlformats.org/officeDocument/2006/relationships" xmlns:p="http://schemas.openxmlformats.org/presentationml/2006/main" type="title" preserve="1">
   <p:cSld name="Title Slide">
@@ -611,7 +1097,7 @@
           <a:p>
             <a:fld id="{9181C8EF-4BEF-A44C-AE9C-F9DB6998CAEE}" type="datetimeFigureOut">
               <a:rPr lang="en-US" smtClean="0"/>
-              <a:t>2/16/2022</a:t>
+              <a:t>4/20/2022</a:t>
             </a:fld>
             <a:endParaRPr lang="en-US" dirty="0"/>
           </a:p>
@@ -809,7 +1295,7 @@
           <a:p>
             <a:fld id="{9181C8EF-4BEF-A44C-AE9C-F9DB6998CAEE}" type="datetimeFigureOut">
               <a:rPr lang="en-US" smtClean="0"/>
-              <a:t>2/16/2022</a:t>
+              <a:t>4/20/2022</a:t>
             </a:fld>
             <a:endParaRPr lang="en-US" dirty="0"/>
           </a:p>
@@ -1017,7 +1503,7 @@
           <a:p>
             <a:fld id="{9181C8EF-4BEF-A44C-AE9C-F9DB6998CAEE}" type="datetimeFigureOut">
               <a:rPr lang="en-US" smtClean="0"/>
-              <a:t>2/16/2022</a:t>
+              <a:t>4/20/2022</a:t>
             </a:fld>
             <a:endParaRPr lang="en-US" dirty="0"/>
           </a:p>
@@ -1215,7 +1701,7 @@
           <a:p>
             <a:fld id="{9181C8EF-4BEF-A44C-AE9C-F9DB6998CAEE}" type="datetimeFigureOut">
               <a:rPr lang="en-US" smtClean="0"/>
-              <a:t>2/16/2022</a:t>
+              <a:t>4/20/2022</a:t>
             </a:fld>
             <a:endParaRPr lang="en-US" dirty="0"/>
           </a:p>
@@ -1490,7 +1976,7 @@
           <a:p>
             <a:fld id="{9181C8EF-4BEF-A44C-AE9C-F9DB6998CAEE}" type="datetimeFigureOut">
               <a:rPr lang="en-US" smtClean="0"/>
-              <a:t>2/16/2022</a:t>
+              <a:t>4/20/2022</a:t>
             </a:fld>
             <a:endParaRPr lang="en-US" dirty="0"/>
           </a:p>
@@ -1755,7 +2241,7 @@
           <a:p>
             <a:fld id="{9181C8EF-4BEF-A44C-AE9C-F9DB6998CAEE}" type="datetimeFigureOut">
               <a:rPr lang="en-US" smtClean="0"/>
-              <a:t>2/16/2022</a:t>
+              <a:t>4/20/2022</a:t>
             </a:fld>
             <a:endParaRPr lang="en-US" dirty="0"/>
           </a:p>
@@ -2167,7 +2653,7 @@
           <a:p>
             <a:fld id="{9181C8EF-4BEF-A44C-AE9C-F9DB6998CAEE}" type="datetimeFigureOut">
               <a:rPr lang="en-US" smtClean="0"/>
-              <a:t>2/16/2022</a:t>
+              <a:t>4/20/2022</a:t>
             </a:fld>
             <a:endParaRPr lang="en-US" dirty="0"/>
           </a:p>
@@ -2308,7 +2794,7 @@
           <a:p>
             <a:fld id="{9181C8EF-4BEF-A44C-AE9C-F9DB6998CAEE}" type="datetimeFigureOut">
               <a:rPr lang="en-US" smtClean="0"/>
-              <a:t>2/16/2022</a:t>
+              <a:t>4/20/2022</a:t>
             </a:fld>
             <a:endParaRPr lang="en-US" dirty="0"/>
           </a:p>
@@ -2421,7 +2907,7 @@
           <a:p>
             <a:fld id="{9181C8EF-4BEF-A44C-AE9C-F9DB6998CAEE}" type="datetimeFigureOut">
               <a:rPr lang="en-US" smtClean="0"/>
-              <a:t>2/16/2022</a:t>
+              <a:t>4/20/2022</a:t>
             </a:fld>
             <a:endParaRPr lang="en-US" dirty="0"/>
           </a:p>
@@ -2732,7 +3218,7 @@
           <a:p>
             <a:fld id="{9181C8EF-4BEF-A44C-AE9C-F9DB6998CAEE}" type="datetimeFigureOut">
               <a:rPr lang="en-US" smtClean="0"/>
-              <a:t>2/16/2022</a:t>
+              <a:t>4/20/2022</a:t>
             </a:fld>
             <a:endParaRPr lang="en-US" dirty="0"/>
           </a:p>
@@ -3020,7 +3506,7 @@
           <a:p>
             <a:fld id="{9181C8EF-4BEF-A44C-AE9C-F9DB6998CAEE}" type="datetimeFigureOut">
               <a:rPr lang="en-US" smtClean="0"/>
-              <a:t>2/16/2022</a:t>
+              <a:t>4/20/2022</a:t>
             </a:fld>
             <a:endParaRPr lang="en-US" dirty="0"/>
           </a:p>
@@ -3261,7 +3747,7 @@
           <a:p>
             <a:fld id="{9181C8EF-4BEF-A44C-AE9C-F9DB6998CAEE}" type="datetimeFigureOut">
               <a:rPr lang="en-US" smtClean="0"/>
-              <a:t>2/16/2022</a:t>
+              <a:t>4/20/2022</a:t>
             </a:fld>
             <a:endParaRPr lang="en-US" dirty="0"/>
           </a:p>
@@ -3749,12 +4235,8 @@
           <a:p>
             <a:pPr algn="ctr"/>
             <a:r>
-              <a:rPr lang="en-US" sz="3200" b="1" u="sng" dirty="0" err="1"/>
-              <a:t>MoCha</a:t>
-            </a:r>
-            <a:r>
               <a:rPr lang="en-US" sz="3200" b="1" u="sng" dirty="0"/>
-              <a:t> Data Hierarchy</a:t>
+              <a:t>MoCha Data Hierarchy</a:t>
             </a:r>
             <a:endParaRPr lang="en-US" sz="3200" u="sng" dirty="0"/>
           </a:p>
@@ -3774,7 +4256,7 @@
         </p:nvSpPr>
         <p:spPr>
           <a:xfrm>
-            <a:off x="72363" y="776221"/>
+            <a:off x="88539" y="223654"/>
             <a:ext cx="1414562" cy="552567"/>
           </a:xfrm>
           <a:prstGeom prst="roundRect">
@@ -3828,10 +4310,195 @@
       </p:sp>
       <p:sp>
         <p:nvSpPr>
-          <p:cNvPr id="5" name="Rounded Rectangle 4">
-            <a:extLst>
-              <a:ext uri="{FF2B5EF4-FFF2-40B4-BE49-F238E27FC236}">
-                <a16:creationId xmlns:a16="http://schemas.microsoft.com/office/drawing/2014/main" id="{42E74728-C934-0E4A-BCED-1AFDC843C4BD}"/>
+          <p:cNvPr id="66" name="TextBox 65">
+            <a:extLst>
+              <a:ext uri="{FF2B5EF4-FFF2-40B4-BE49-F238E27FC236}">
+                <a16:creationId xmlns:a16="http://schemas.microsoft.com/office/drawing/2014/main" id="{D8C63104-87D2-C24C-B9B8-B00A859161D6}"/>
+              </a:ext>
+            </a:extLst>
+          </p:cNvPr>
+          <p:cNvSpPr txBox="1"/>
+          <p:nvPr/>
+        </p:nvSpPr>
+        <p:spPr>
+          <a:xfrm>
+            <a:off x="1532973" y="68108"/>
+            <a:ext cx="4883093" cy="1384995"/>
+          </a:xfrm>
+          <a:prstGeom prst="rect">
+            <a:avLst/>
+          </a:prstGeom>
+          <a:noFill/>
+        </p:spPr>
+        <p:txBody>
+          <a:bodyPr wrap="square" rtlCol="0">
+            <a:spAutoFit/>
+          </a:bodyPr>
+          <a:lstStyle/>
+          <a:p>
+            <a:pPr marL="285750" indent="-285750">
+              <a:buFont typeface="Arial" panose="020B0604020202020204" pitchFamily="34" charset="0"/>
+              <a:buChar char="•"/>
+            </a:pPr>
+            <a:r>
+              <a:rPr lang="en-US" sz="1200" dirty="0"/>
+              <a:t>data_owner (Mickey Williams)</a:t>
+            </a:r>
+          </a:p>
+          <a:p>
+            <a:pPr marL="285750" indent="-285750">
+              <a:buFont typeface="Arial" panose="020B0604020202020204" pitchFamily="34" charset="0"/>
+              <a:buChar char="•"/>
+            </a:pPr>
+            <a:r>
+              <a:rPr lang="en-US" sz="1200" dirty="0"/>
+              <a:t>data_owner_affiliation</a:t>
+            </a:r>
+          </a:p>
+          <a:p>
+            <a:pPr marL="285750" indent="-285750">
+              <a:buFont typeface="Arial" panose="020B0604020202020204" pitchFamily="34" charset="0"/>
+              <a:buChar char="•"/>
+            </a:pPr>
+            <a:r>
+              <a:rPr lang="en-US" sz="1200" dirty="0"/>
+              <a:t>data_owner_email</a:t>
+            </a:r>
+          </a:p>
+          <a:p>
+            <a:pPr marL="285750" indent="-285750">
+              <a:buFont typeface="Arial" panose="020B0604020202020204" pitchFamily="34" charset="0"/>
+              <a:buChar char="•"/>
+            </a:pPr>
+            <a:r>
+              <a:rPr lang="en-US" sz="1200" dirty="0"/>
+              <a:t>data_curator</a:t>
+            </a:r>
+          </a:p>
+          <a:p>
+            <a:pPr marL="285750" indent="-285750">
+              <a:buFont typeface="Arial" panose="020B0604020202020204" pitchFamily="34" charset="0"/>
+              <a:buChar char="•"/>
+            </a:pPr>
+            <a:r>
+              <a:rPr lang="en-US" sz="1200" dirty="0"/>
+              <a:t>data_curator_email</a:t>
+            </a:r>
+          </a:p>
+          <a:p>
+            <a:pPr marL="285750" indent="-285750">
+              <a:buFont typeface="Arial" panose="020B0604020202020204" pitchFamily="34" charset="0"/>
+              <a:buChar char="•"/>
+            </a:pPr>
+            <a:r>
+              <a:rPr lang="en-US" sz="1200" dirty="0"/>
+              <a:t>data_curator_affiliation </a:t>
+            </a:r>
+          </a:p>
+          <a:p>
+            <a:pPr marL="285750" indent="-285750">
+              <a:buFont typeface="Arial" panose="020B0604020202020204" pitchFamily="34" charset="0"/>
+              <a:buChar char="•"/>
+            </a:pPr>
+            <a:r>
+              <a:rPr lang="en-US" sz="1200" dirty="0"/>
+              <a:t>data_generating_facility</a:t>
+            </a:r>
+          </a:p>
+        </p:txBody>
+      </p:sp>
+      <p:sp>
+        <p:nvSpPr>
+          <p:cNvPr id="67" name="TextBox 66">
+            <a:extLst>
+              <a:ext uri="{FF2B5EF4-FFF2-40B4-BE49-F238E27FC236}">
+                <a16:creationId xmlns:a16="http://schemas.microsoft.com/office/drawing/2014/main" id="{9BD2AEAF-B56D-D148-B10F-D4062C1B32AA}"/>
+              </a:ext>
+            </a:extLst>
+          </p:cNvPr>
+          <p:cNvSpPr txBox="1"/>
+          <p:nvPr/>
+        </p:nvSpPr>
+        <p:spPr>
+          <a:xfrm>
+            <a:off x="1203573" y="2365386"/>
+            <a:ext cx="1481126" cy="1384995"/>
+          </a:xfrm>
+          <a:prstGeom prst="rect">
+            <a:avLst/>
+          </a:prstGeom>
+          <a:noFill/>
+        </p:spPr>
+        <p:txBody>
+          <a:bodyPr wrap="square" rtlCol="0">
+            <a:spAutoFit/>
+          </a:bodyPr>
+          <a:lstStyle/>
+          <a:p>
+            <a:pPr marL="171450" indent="-171450">
+              <a:buFont typeface="Arial" panose="020B0604020202020204" pitchFamily="34" charset="0"/>
+              <a:buChar char="•"/>
+            </a:pPr>
+            <a:r>
+              <a:rPr lang="en-US" sz="1200" dirty="0"/>
+              <a:t>platform_name</a:t>
+            </a:r>
+          </a:p>
+          <a:p>
+            <a:pPr marL="171450" indent="-171450">
+              <a:buFont typeface="Arial" panose="020B0604020202020204" pitchFamily="34" charset="0"/>
+              <a:buChar char="•"/>
+            </a:pPr>
+            <a:r>
+              <a:rPr lang="en-US" sz="1200" dirty="0"/>
+              <a:t>organism</a:t>
+            </a:r>
+          </a:p>
+          <a:p>
+            <a:pPr marL="171450" indent="-171450">
+              <a:buFont typeface="Arial" panose="020B0604020202020204" pitchFamily="34" charset="0"/>
+              <a:buChar char="•"/>
+            </a:pPr>
+            <a:r>
+              <a:rPr lang="en-US" sz="1200" dirty="0"/>
+              <a:t>access</a:t>
+            </a:r>
+          </a:p>
+          <a:p>
+            <a:pPr marL="171450" indent="-171450">
+              <a:buFont typeface="Arial" panose="020B0604020202020204" pitchFamily="34" charset="0"/>
+              <a:buChar char="•"/>
+            </a:pPr>
+            <a:r>
+              <a:rPr lang="en-US" sz="1200" dirty="0"/>
+              <a:t>retention_years</a:t>
+            </a:r>
+          </a:p>
+          <a:p>
+            <a:pPr marL="171450" indent="-171450">
+              <a:buFont typeface="Arial" panose="020B0604020202020204" pitchFamily="34" charset="0"/>
+              <a:buChar char="•"/>
+            </a:pPr>
+            <a:endParaRPr lang="en-US" sz="1200" dirty="0"/>
+          </a:p>
+          <a:p>
+            <a:pPr marL="171450" indent="-171450">
+              <a:buFont typeface="Arial" panose="020B0604020202020204" pitchFamily="34" charset="0"/>
+              <a:buChar char="•"/>
+            </a:pPr>
+            <a:endParaRPr lang="en-US" sz="1200" dirty="0"/>
+          </a:p>
+          <a:p>
+            <a:endParaRPr lang="en-US" sz="1200" dirty="0"/>
+          </a:p>
+        </p:txBody>
+      </p:sp>
+      <p:sp>
+        <p:nvSpPr>
+          <p:cNvPr id="23" name="Rounded Rectangle 22">
+            <a:extLst>
+              <a:ext uri="{FF2B5EF4-FFF2-40B4-BE49-F238E27FC236}">
+                <a16:creationId xmlns:a16="http://schemas.microsoft.com/office/drawing/2014/main" id="{2A4B3590-B853-724A-9466-DDFB3B1CAB41}"/>
               </a:ext>
             </a:extLst>
           </p:cNvPr>
@@ -3840,8 +4507,8 @@
         </p:nvSpPr>
         <p:spPr>
           <a:xfrm>
-            <a:off x="1327787" y="1877768"/>
-            <a:ext cx="1919914" cy="544818"/>
+            <a:off x="4008803" y="965573"/>
+            <a:ext cx="1260373" cy="665020"/>
           </a:xfrm>
           <a:prstGeom prst="roundRect">
             <a:avLst/>
@@ -3886,22 +4553,18 @@
           <a:p>
             <a:pPr algn="ctr"/>
             <a:r>
-              <a:rPr lang="en-US" b="1" dirty="0" err="1"/>
-              <a:t>Project_Illumina</a:t>
-            </a:r>
-            <a:r>
               <a:rPr lang="en-US" b="1" dirty="0"/>
-              <a:t> </a:t>
-            </a:r>
-          </a:p>
-        </p:txBody>
-      </p:sp>
-      <p:sp>
-        <p:nvSpPr>
-          <p:cNvPr id="66" name="TextBox 65">
-            <a:extLst>
-              <a:ext uri="{FF2B5EF4-FFF2-40B4-BE49-F238E27FC236}">
-                <a16:creationId xmlns:a16="http://schemas.microsoft.com/office/drawing/2014/main" id="{D8C63104-87D2-C24C-B9B8-B00A859161D6}"/>
+              <a:t>Flowcell_X</a:t>
+            </a:r>
+          </a:p>
+        </p:txBody>
+      </p:sp>
+      <p:sp>
+        <p:nvSpPr>
+          <p:cNvPr id="99" name="TextBox 98">
+            <a:extLst>
+              <a:ext uri="{FF2B5EF4-FFF2-40B4-BE49-F238E27FC236}">
+                <a16:creationId xmlns:a16="http://schemas.microsoft.com/office/drawing/2014/main" id="{7CC9A911-B0A7-AF46-8C4C-518D3F4D6528}"/>
               </a:ext>
             </a:extLst>
           </p:cNvPr>
@@ -3910,8 +4573,8 @@
         </p:nvSpPr>
         <p:spPr>
           <a:xfrm>
-            <a:off x="1630729" y="773603"/>
-            <a:ext cx="4883093" cy="1015663"/>
+            <a:off x="9133494" y="1525148"/>
+            <a:ext cx="2461206" cy="830997"/>
           </a:xfrm>
           <a:prstGeom prst="rect">
             <a:avLst/>
@@ -3924,145 +4587,18 @@
           </a:bodyPr>
           <a:lstStyle/>
           <a:p>
-            <a:pPr marL="285750" indent="-285750">
-              <a:buFont typeface="Arial" panose="020B0604020202020204" pitchFamily="34" charset="0"/>
-              <a:buChar char="•"/>
-            </a:pPr>
-            <a:r>
-              <a:rPr lang="en-US" sz="1200" dirty="0" err="1">
-                <a:solidFill>
-                  <a:srgbClr val="FF0000"/>
-                </a:solidFill>
-              </a:rPr>
-              <a:t>pi_name</a:t>
-            </a:r>
-            <a:r>
-              <a:rPr lang="en-US" sz="1200" dirty="0">
-                <a:solidFill>
-                  <a:srgbClr val="FF0000"/>
-                </a:solidFill>
-              </a:rPr>
-              <a:t> (Mickey Williams)</a:t>
-            </a:r>
-          </a:p>
-          <a:p>
-            <a:pPr marL="285750" indent="-285750">
-              <a:buFont typeface="Arial" panose="020B0604020202020204" pitchFamily="34" charset="0"/>
-              <a:buChar char="•"/>
-            </a:pPr>
-            <a:r>
-              <a:rPr lang="en-US" sz="1200" dirty="0" err="1">
-                <a:solidFill>
-                  <a:srgbClr val="FF0000"/>
-                </a:solidFill>
-              </a:rPr>
-              <a:t>data_owner</a:t>
-            </a:r>
-            <a:endParaRPr lang="en-US" sz="1200" dirty="0">
-              <a:solidFill>
-                <a:srgbClr val="FF0000"/>
-              </a:solidFill>
-            </a:endParaRPr>
-          </a:p>
-          <a:p>
-            <a:pPr marL="285750" indent="-285750">
-              <a:buFont typeface="Arial" panose="020B0604020202020204" pitchFamily="34" charset="0"/>
-              <a:buChar char="•"/>
-            </a:pPr>
-            <a:r>
-              <a:rPr lang="en-US" sz="1200" dirty="0" err="1">
-                <a:solidFill>
-                  <a:srgbClr val="FF0000"/>
-                </a:solidFill>
-              </a:rPr>
-              <a:t>data_curator</a:t>
-            </a:r>
-            <a:endParaRPr lang="en-US" sz="1200" dirty="0">
-              <a:solidFill>
-                <a:srgbClr val="FF0000"/>
-              </a:solidFill>
-            </a:endParaRPr>
-          </a:p>
-          <a:p>
-            <a:pPr marL="285750" indent="-285750">
-              <a:buFont typeface="Arial" panose="020B0604020202020204" pitchFamily="34" charset="0"/>
-              <a:buChar char="•"/>
-            </a:pPr>
-            <a:r>
-              <a:rPr lang="en-US" sz="1200" dirty="0">
-                <a:solidFill>
-                  <a:srgbClr val="FF0000"/>
-                </a:solidFill>
-              </a:rPr>
-              <a:t>affiliation (Molecular Characterization Laboratory, FNL)</a:t>
-            </a:r>
-          </a:p>
-          <a:p>
-            <a:pPr marL="285750" indent="-285750">
-              <a:buFont typeface="Arial" panose="020B0604020202020204" pitchFamily="34" charset="0"/>
-              <a:buChar char="•"/>
-            </a:pPr>
-            <a:r>
-              <a:rPr lang="en-US" sz="1200" dirty="0" err="1">
-                <a:solidFill>
-                  <a:srgbClr val="00B050"/>
-                </a:solidFill>
-              </a:rPr>
-              <a:t>data_generating_facility</a:t>
-            </a:r>
-            <a:endParaRPr lang="en-US" sz="1200" dirty="0">
-              <a:solidFill>
-                <a:srgbClr val="00B050"/>
-              </a:solidFill>
-            </a:endParaRPr>
-          </a:p>
-        </p:txBody>
-      </p:sp>
-      <p:sp>
-        <p:nvSpPr>
-          <p:cNvPr id="67" name="TextBox 66">
-            <a:extLst>
-              <a:ext uri="{FF2B5EF4-FFF2-40B4-BE49-F238E27FC236}">
-                <a16:creationId xmlns:a16="http://schemas.microsoft.com/office/drawing/2014/main" id="{9BD2AEAF-B56D-D148-B10F-D4062C1B32AA}"/>
-              </a:ext>
-            </a:extLst>
-          </p:cNvPr>
-          <p:cNvSpPr txBox="1"/>
-          <p:nvPr/>
-        </p:nvSpPr>
-        <p:spPr>
-          <a:xfrm>
-            <a:off x="1177981" y="2569836"/>
-            <a:ext cx="2182041" cy="3416320"/>
-          </a:xfrm>
-          <a:prstGeom prst="rect">
-            <a:avLst/>
-          </a:prstGeom>
-          <a:noFill/>
-        </p:spPr>
-        <p:txBody>
-          <a:bodyPr wrap="square" rtlCol="0">
-            <a:spAutoFit/>
-          </a:bodyPr>
-          <a:lstStyle/>
-          <a:p>
             <a:pPr marL="171450" indent="-171450">
               <a:buFont typeface="Arial" panose="020B0604020202020204" pitchFamily="34" charset="0"/>
               <a:buChar char="•"/>
             </a:pPr>
             <a:r>
-              <a:rPr lang="en-US" sz="1200" dirty="0" err="1">
-                <a:solidFill>
-                  <a:srgbClr val="FF0000"/>
+              <a:rPr lang="en-US" sz="1200" dirty="0">
+                <a:solidFill>
+                  <a:schemeClr val="accent1"/>
                 </a:solidFill>
               </a:rPr>
-              <a:t>project_id</a:t>
-            </a:r>
-            <a:endParaRPr lang="en-US" sz="1200" dirty="0">
-              <a:solidFill>
-                <a:srgbClr val="FF0000"/>
-              </a:solidFill>
-            </a:endParaRPr>
+              <a:t>object_name</a:t>
+            </a:r>
           </a:p>
           <a:p>
             <a:pPr marL="171450" indent="-171450">
@@ -4070,18 +4606,13 @@
               <a:buChar char="•"/>
             </a:pPr>
             <a:r>
-              <a:rPr lang="en-US" sz="1200" dirty="0" err="1">
-                <a:solidFill>
-                  <a:srgbClr val="FF0000"/>
+              <a:rPr lang="en-US" sz="1200" dirty="0">
+                <a:solidFill>
+                  <a:schemeClr val="accent1"/>
                 </a:solidFill>
               </a:rPr>
-              <a:t>project_title</a:t>
-            </a:r>
-            <a:endParaRPr lang="en-US" sz="1200" dirty="0">
-              <a:solidFill>
-                <a:srgbClr val="FF0000"/>
-              </a:solidFill>
-            </a:endParaRPr>
+              <a:t>file_type</a:t>
+            </a:r>
           </a:p>
           <a:p>
             <a:pPr marL="171450" indent="-171450">
@@ -4089,18 +4620,13 @@
               <a:buChar char="•"/>
             </a:pPr>
             <a:r>
-              <a:rPr lang="en-US" sz="1200" dirty="0" err="1">
-                <a:solidFill>
-                  <a:srgbClr val="FF0000"/>
+              <a:rPr lang="en-US" sz="1200" dirty="0">
+                <a:solidFill>
+                  <a:schemeClr val="accent1"/>
                 </a:solidFill>
               </a:rPr>
-              <a:t>project_description</a:t>
-            </a:r>
-            <a:endParaRPr lang="en-US" sz="1200" dirty="0">
-              <a:solidFill>
-                <a:srgbClr val="FF0000"/>
-              </a:solidFill>
-            </a:endParaRPr>
+              <a:t>source_path</a:t>
+            </a:r>
           </a:p>
           <a:p>
             <a:pPr marL="171450" indent="-171450">
@@ -4110,345 +4636,30 @@
             <a:r>
               <a:rPr lang="en-US" sz="1200" dirty="0">
                 <a:solidFill>
-                  <a:srgbClr val="FF0000"/>
+                  <a:schemeClr val="accent1"/>
                 </a:solidFill>
               </a:rPr>
-              <a:t>organism</a:t>
-            </a:r>
-          </a:p>
-          <a:p>
-            <a:pPr marL="171450" indent="-171450">
-              <a:buFont typeface="Arial" panose="020B0604020202020204" pitchFamily="34" charset="0"/>
-              <a:buChar char="•"/>
-            </a:pPr>
-            <a:r>
-              <a:rPr lang="en-US" sz="1200" dirty="0" err="1">
-                <a:solidFill>
-                  <a:srgbClr val="FF0000"/>
-                </a:solidFill>
-              </a:rPr>
-              <a:t>platform_name</a:t>
-            </a:r>
-            <a:endParaRPr lang="en-US" sz="1200" dirty="0">
-              <a:solidFill>
-                <a:srgbClr val="FF0000"/>
-              </a:solidFill>
-            </a:endParaRPr>
-          </a:p>
-          <a:p>
-            <a:pPr marL="171450" indent="-171450">
-              <a:buFont typeface="Arial" panose="020B0604020202020204" pitchFamily="34" charset="0"/>
-              <a:buChar char="•"/>
-            </a:pPr>
-            <a:r>
-              <a:rPr lang="en-US" sz="1200" dirty="0" err="1">
-                <a:solidFill>
-                  <a:srgbClr val="FF0000"/>
-                </a:solidFill>
-              </a:rPr>
-              <a:t>project_start_date</a:t>
-            </a:r>
-            <a:endParaRPr lang="en-US" sz="1200" dirty="0">
-              <a:solidFill>
-                <a:srgbClr val="FF0000"/>
-              </a:solidFill>
-            </a:endParaRPr>
-          </a:p>
-          <a:p>
-            <a:pPr marL="171450" indent="-171450">
-              <a:buFont typeface="Arial" panose="020B0604020202020204" pitchFamily="34" charset="0"/>
-              <a:buChar char="•"/>
-            </a:pPr>
-            <a:r>
-              <a:rPr lang="en-US" sz="1200" dirty="0" err="1">
-                <a:solidFill>
-                  <a:srgbClr val="FF0000"/>
-                </a:solidFill>
-              </a:rPr>
-              <a:t>project_status</a:t>
-            </a:r>
-            <a:endParaRPr lang="en-US" sz="1200" dirty="0">
-              <a:solidFill>
-                <a:srgbClr val="FF0000"/>
-              </a:solidFill>
-            </a:endParaRPr>
-          </a:p>
-          <a:p>
-            <a:pPr marL="171450" indent="-171450">
-              <a:buFont typeface="Arial" panose="020B0604020202020204" pitchFamily="34" charset="0"/>
-              <a:buChar char="•"/>
-            </a:pPr>
-            <a:r>
-              <a:rPr lang="en-US" sz="1200" dirty="0">
-                <a:solidFill>
-                  <a:srgbClr val="FF0000"/>
-                </a:solidFill>
-              </a:rPr>
-              <a:t>access</a:t>
-            </a:r>
-          </a:p>
-          <a:p>
-            <a:pPr marL="171450" indent="-171450">
-              <a:buFont typeface="Arial" panose="020B0604020202020204" pitchFamily="34" charset="0"/>
-              <a:buChar char="•"/>
-            </a:pPr>
-            <a:r>
-              <a:rPr lang="en-US" sz="1200" dirty="0" err="1">
-                <a:solidFill>
-                  <a:srgbClr val="FF0000"/>
-                </a:solidFill>
-              </a:rPr>
-              <a:t>retention_years</a:t>
-            </a:r>
-            <a:endParaRPr lang="en-US" sz="1200" dirty="0">
-              <a:solidFill>
-                <a:srgbClr val="FF0000"/>
-              </a:solidFill>
-            </a:endParaRPr>
-          </a:p>
-          <a:p>
-            <a:pPr marL="171450" indent="-171450">
-              <a:buFont typeface="Arial" panose="020B0604020202020204" pitchFamily="34" charset="0"/>
-              <a:buChar char="•"/>
-            </a:pPr>
-            <a:r>
-              <a:rPr lang="en-US" sz="1200" dirty="0" err="1">
-                <a:solidFill>
-                  <a:srgbClr val="FF0000"/>
-                </a:solidFill>
-              </a:rPr>
-              <a:t>project_poc</a:t>
-            </a:r>
-            <a:endParaRPr lang="en-US" sz="1200" dirty="0">
-              <a:solidFill>
-                <a:srgbClr val="FF0000"/>
-              </a:solidFill>
-            </a:endParaRPr>
-          </a:p>
-          <a:p>
-            <a:pPr marL="171450" indent="-171450">
-              <a:buFont typeface="Arial" panose="020B0604020202020204" pitchFamily="34" charset="0"/>
-              <a:buChar char="•"/>
-            </a:pPr>
-            <a:r>
-              <a:rPr lang="en-US" sz="1200" dirty="0" err="1">
-                <a:solidFill>
-                  <a:srgbClr val="FF0000"/>
-                </a:solidFill>
-              </a:rPr>
-              <a:t>project_poc_email</a:t>
-            </a:r>
-            <a:endParaRPr lang="en-US" sz="1200" dirty="0">
-              <a:solidFill>
-                <a:srgbClr val="FF0000"/>
-              </a:solidFill>
-            </a:endParaRPr>
-          </a:p>
-          <a:p>
-            <a:pPr marL="171450" indent="-171450">
-              <a:buFont typeface="Arial" panose="020B0604020202020204" pitchFamily="34" charset="0"/>
-              <a:buChar char="•"/>
-            </a:pPr>
-            <a:r>
-              <a:rPr lang="en-US" sz="1200" dirty="0" err="1">
-                <a:solidFill>
-                  <a:srgbClr val="00B050"/>
-                </a:solidFill>
-              </a:rPr>
-              <a:t>is_cell_line</a:t>
-            </a:r>
-            <a:endParaRPr lang="en-US" sz="1200" dirty="0">
-              <a:solidFill>
-                <a:srgbClr val="00B050"/>
-              </a:solidFill>
-            </a:endParaRPr>
-          </a:p>
-          <a:p>
-            <a:pPr marL="171450" indent="-171450">
-              <a:buFont typeface="Arial" panose="020B0604020202020204" pitchFamily="34" charset="0"/>
-              <a:buChar char="•"/>
-            </a:pPr>
-            <a:r>
-              <a:rPr lang="en-US" sz="1200" dirty="0" err="1">
-                <a:solidFill>
-                  <a:srgbClr val="00B050"/>
-                </a:solidFill>
-              </a:rPr>
-              <a:t>project_completed_date</a:t>
-            </a:r>
-            <a:endParaRPr lang="en-US" sz="1200" dirty="0">
-              <a:solidFill>
-                <a:srgbClr val="00B050"/>
-              </a:solidFill>
-            </a:endParaRPr>
-          </a:p>
-          <a:p>
-            <a:pPr marL="171450" indent="-171450">
-              <a:buFont typeface="Arial" panose="020B0604020202020204" pitchFamily="34" charset="0"/>
-              <a:buChar char="•"/>
-            </a:pPr>
-            <a:r>
-              <a:rPr lang="en-US" sz="1200" dirty="0">
-                <a:solidFill>
-                  <a:srgbClr val="00B050"/>
-                </a:solidFill>
-              </a:rPr>
-              <a:t>deposition</a:t>
-            </a:r>
-          </a:p>
-          <a:p>
-            <a:pPr marL="171450" indent="-171450">
-              <a:buFont typeface="Arial" panose="020B0604020202020204" pitchFamily="34" charset="0"/>
-              <a:buChar char="•"/>
-            </a:pPr>
-            <a:r>
-              <a:rPr lang="en-US" sz="1200" dirty="0">
-                <a:solidFill>
-                  <a:srgbClr val="00B050"/>
-                </a:solidFill>
-              </a:rPr>
-              <a:t>publications</a:t>
-            </a:r>
-          </a:p>
-          <a:p>
-            <a:pPr marL="171450" indent="-171450">
-              <a:buFont typeface="Arial" panose="020B0604020202020204" pitchFamily="34" charset="0"/>
-              <a:buChar char="•"/>
-            </a:pPr>
-            <a:r>
-              <a:rPr lang="en-US" sz="1200" dirty="0">
-                <a:solidFill>
-                  <a:srgbClr val="00B050"/>
-                </a:solidFill>
-              </a:rPr>
-              <a:t>collaborators</a:t>
-            </a:r>
-          </a:p>
-          <a:p>
-            <a:pPr marL="171450" indent="-171450">
-              <a:buFont typeface="Arial" panose="020B0604020202020204" pitchFamily="34" charset="0"/>
-              <a:buChar char="•"/>
-            </a:pPr>
-            <a:endParaRPr lang="en-US" sz="1200" dirty="0">
-              <a:solidFill>
-                <a:srgbClr val="00B050"/>
-              </a:solidFill>
-            </a:endParaRPr>
-          </a:p>
-          <a:p>
-            <a:endParaRPr lang="en-US" sz="1200" b="1" dirty="0">
-              <a:solidFill>
-                <a:schemeClr val="accent1"/>
-              </a:solidFill>
-            </a:endParaRPr>
-          </a:p>
-        </p:txBody>
-      </p:sp>
-      <p:sp>
-        <p:nvSpPr>
-          <p:cNvPr id="80" name="TextBox 79">
-            <a:extLst>
-              <a:ext uri="{FF2B5EF4-FFF2-40B4-BE49-F238E27FC236}">
-                <a16:creationId xmlns:a16="http://schemas.microsoft.com/office/drawing/2014/main" id="{FA833EAE-8D26-4D40-A8F6-0F47974E5446}"/>
-              </a:ext>
-            </a:extLst>
-          </p:cNvPr>
-          <p:cNvSpPr txBox="1"/>
+              <a:t>source_checksum</a:t>
+            </a:r>
+          </a:p>
+        </p:txBody>
+      </p:sp>
+      <p:sp>
+        <p:nvSpPr>
+          <p:cNvPr id="22" name="Rounded Rectangle 54">
+            <a:extLst>
+              <a:ext uri="{FF2B5EF4-FFF2-40B4-BE49-F238E27FC236}">
+                <a16:creationId xmlns:a16="http://schemas.microsoft.com/office/drawing/2014/main" id="{0FADA1C4-3F77-4727-8E6A-533BBA61DE6B}"/>
+              </a:ext>
+            </a:extLst>
+          </p:cNvPr>
+          <p:cNvSpPr/>
           <p:nvPr/>
         </p:nvSpPr>
         <p:spPr>
           <a:xfrm>
-            <a:off x="8145450" y="5475552"/>
-            <a:ext cx="3905107" cy="1200329"/>
-          </a:xfrm>
-          <a:prstGeom prst="rect">
-            <a:avLst/>
-          </a:prstGeom>
-          <a:noFill/>
-          <a:ln w="3175">
-            <a:solidFill>
-              <a:schemeClr val="tx1">
-                <a:lumMod val="50000"/>
-                <a:lumOff val="50000"/>
-              </a:schemeClr>
-            </a:solidFill>
-          </a:ln>
-        </p:spPr>
-        <p:txBody>
-          <a:bodyPr wrap="square" rtlCol="0">
-            <a:spAutoFit/>
-          </a:bodyPr>
-          <a:lstStyle/>
-          <a:p>
-            <a:r>
-              <a:rPr lang="en-US" sz="1200" u="sng" dirty="0"/>
-              <a:t>Legend:</a:t>
-            </a:r>
-          </a:p>
-          <a:p>
-            <a:r>
-              <a:rPr lang="en-US" sz="1200" b="1" dirty="0"/>
-              <a:t>Black:  Collection/File name</a:t>
-            </a:r>
-          </a:p>
-          <a:p>
-            <a:r>
-              <a:rPr lang="en-US" sz="1200" dirty="0">
-                <a:solidFill>
-                  <a:srgbClr val="FF0000"/>
-                </a:solidFill>
-              </a:rPr>
-              <a:t>Red: Mandatory metadata</a:t>
-            </a:r>
-          </a:p>
-          <a:p>
-            <a:r>
-              <a:rPr lang="en-US" sz="1200" b="1" dirty="0">
-                <a:solidFill>
-                  <a:schemeClr val="accent6"/>
-                </a:solidFill>
-              </a:rPr>
-              <a:t>Green – Optional metadata</a:t>
-            </a:r>
-          </a:p>
-          <a:p>
-            <a:r>
-              <a:rPr lang="en-US" sz="1200" b="1" dirty="0">
-                <a:solidFill>
-                  <a:schemeClr val="accent1"/>
-                </a:solidFill>
-              </a:rPr>
-              <a:t>Blue: Derived metadata  (automatically derived from the </a:t>
-            </a:r>
-          </a:p>
-          <a:p>
-            <a:r>
-              <a:rPr lang="en-US" sz="1200" b="1" dirty="0">
-                <a:solidFill>
-                  <a:schemeClr val="accent1"/>
-                </a:solidFill>
-              </a:rPr>
-              <a:t>folder structure and folder names in the previous slide).</a:t>
-            </a:r>
-          </a:p>
-        </p:txBody>
-      </p:sp>
-      <p:sp>
-        <p:nvSpPr>
-          <p:cNvPr id="23" name="Rounded Rectangle 22">
-            <a:extLst>
-              <a:ext uri="{FF2B5EF4-FFF2-40B4-BE49-F238E27FC236}">
-                <a16:creationId xmlns:a16="http://schemas.microsoft.com/office/drawing/2014/main" id="{2A4B3590-B853-724A-9466-DDFB3B1CAB41}"/>
-              </a:ext>
-            </a:extLst>
-          </p:cNvPr>
-          <p:cNvSpPr/>
-          <p:nvPr/>
-        </p:nvSpPr>
-        <p:spPr>
-          <a:xfrm>
-            <a:off x="3511232" y="2641904"/>
-            <a:ext cx="1803744" cy="550211"/>
+            <a:off x="5797322" y="1277016"/>
+            <a:ext cx="1373469" cy="543810"/>
           </a:xfrm>
           <a:prstGeom prst="roundRect">
             <a:avLst/>
@@ -4493,19 +4704,466 @@
           <a:p>
             <a:pPr algn="ctr"/>
             <a:r>
-              <a:rPr lang="en-US" b="1" dirty="0" err="1"/>
-              <a:t>Flowcell_X</a:t>
-            </a:r>
-            <a:endParaRPr lang="en-US" b="1" dirty="0"/>
-          </a:p>
-        </p:txBody>
-      </p:sp>
-      <p:sp>
-        <p:nvSpPr>
-          <p:cNvPr id="55" name="Rounded Rectangle 54">
-            <a:extLst>
-              <a:ext uri="{FF2B5EF4-FFF2-40B4-BE49-F238E27FC236}">
-                <a16:creationId xmlns:a16="http://schemas.microsoft.com/office/drawing/2014/main" id="{2FF533C9-9CD9-8848-83BD-2AC8B05DC8C4}"/>
+              <a:rPr lang="en-US" b="1" dirty="0"/>
+              <a:t>BCL</a:t>
+            </a:r>
+            <a:endParaRPr lang="en-US" sz="1400" dirty="0">
+              <a:highlight>
+                <a:srgbClr val="FFFF00"/>
+              </a:highlight>
+            </a:endParaRPr>
+          </a:p>
+        </p:txBody>
+      </p:sp>
+      <p:sp>
+        <p:nvSpPr>
+          <p:cNvPr id="24" name="TextBox 56">
+            <a:extLst>
+              <a:ext uri="{FF2B5EF4-FFF2-40B4-BE49-F238E27FC236}">
+                <a16:creationId xmlns:a16="http://schemas.microsoft.com/office/drawing/2014/main" id="{E204D8E5-D09A-B845-9062-DC21BE061833}"/>
+              </a:ext>
+            </a:extLst>
+          </p:cNvPr>
+          <p:cNvSpPr txBox="1"/>
+          <p:nvPr/>
+        </p:nvSpPr>
+        <p:spPr>
+          <a:xfrm>
+            <a:off x="9148126" y="694151"/>
+            <a:ext cx="2446574" cy="830997"/>
+          </a:xfrm>
+          <a:prstGeom prst="rect">
+            <a:avLst/>
+          </a:prstGeom>
+          <a:noFill/>
+        </p:spPr>
+        <p:txBody>
+          <a:bodyPr wrap="square" rtlCol="0">
+            <a:spAutoFit/>
+          </a:bodyPr>
+          <a:lstStyle>
+            <a:defPPr>
+              <a:defRPr lang="en-US"/>
+            </a:defPPr>
+            <a:lvl1pPr marL="0" algn="l" defTabSz="914400" rtl="0" eaLnBrk="1" latinLnBrk="0" hangingPunct="1">
+              <a:defRPr sz="1800" kern="1200">
+                <a:solidFill>
+                  <a:schemeClr val="tx1"/>
+                </a:solidFill>
+                <a:latin typeface="+mn-lt"/>
+                <a:ea typeface="+mn-ea"/>
+                <a:cs typeface="+mn-cs"/>
+              </a:defRPr>
+            </a:lvl1pPr>
+            <a:lvl2pPr marL="457200" algn="l" defTabSz="914400" rtl="0" eaLnBrk="1" latinLnBrk="0" hangingPunct="1">
+              <a:defRPr sz="1800" kern="1200">
+                <a:solidFill>
+                  <a:schemeClr val="tx1"/>
+                </a:solidFill>
+                <a:latin typeface="+mn-lt"/>
+                <a:ea typeface="+mn-ea"/>
+                <a:cs typeface="+mn-cs"/>
+              </a:defRPr>
+            </a:lvl2pPr>
+            <a:lvl3pPr marL="914400" algn="l" defTabSz="914400" rtl="0" eaLnBrk="1" latinLnBrk="0" hangingPunct="1">
+              <a:defRPr sz="1800" kern="1200">
+                <a:solidFill>
+                  <a:schemeClr val="tx1"/>
+                </a:solidFill>
+                <a:latin typeface="+mn-lt"/>
+                <a:ea typeface="+mn-ea"/>
+                <a:cs typeface="+mn-cs"/>
+              </a:defRPr>
+            </a:lvl3pPr>
+            <a:lvl4pPr marL="1371600" algn="l" defTabSz="914400" rtl="0" eaLnBrk="1" latinLnBrk="0" hangingPunct="1">
+              <a:defRPr sz="1800" kern="1200">
+                <a:solidFill>
+                  <a:schemeClr val="tx1"/>
+                </a:solidFill>
+                <a:latin typeface="+mn-lt"/>
+                <a:ea typeface="+mn-ea"/>
+                <a:cs typeface="+mn-cs"/>
+              </a:defRPr>
+            </a:lvl4pPr>
+            <a:lvl5pPr marL="1828800" algn="l" defTabSz="914400" rtl="0" eaLnBrk="1" latinLnBrk="0" hangingPunct="1">
+              <a:defRPr sz="1800" kern="1200">
+                <a:solidFill>
+                  <a:schemeClr val="tx1"/>
+                </a:solidFill>
+                <a:latin typeface="+mn-lt"/>
+                <a:ea typeface="+mn-ea"/>
+                <a:cs typeface="+mn-cs"/>
+              </a:defRPr>
+            </a:lvl5pPr>
+            <a:lvl6pPr marL="2286000" algn="l" defTabSz="914400" rtl="0" eaLnBrk="1" latinLnBrk="0" hangingPunct="1">
+              <a:defRPr sz="1800" kern="1200">
+                <a:solidFill>
+                  <a:schemeClr val="tx1"/>
+                </a:solidFill>
+                <a:latin typeface="+mn-lt"/>
+                <a:ea typeface="+mn-ea"/>
+                <a:cs typeface="+mn-cs"/>
+              </a:defRPr>
+            </a:lvl6pPr>
+            <a:lvl7pPr marL="2743200" algn="l" defTabSz="914400" rtl="0" eaLnBrk="1" latinLnBrk="0" hangingPunct="1">
+              <a:defRPr sz="1800" kern="1200">
+                <a:solidFill>
+                  <a:schemeClr val="tx1"/>
+                </a:solidFill>
+                <a:latin typeface="+mn-lt"/>
+                <a:ea typeface="+mn-ea"/>
+                <a:cs typeface="+mn-cs"/>
+              </a:defRPr>
+            </a:lvl7pPr>
+            <a:lvl8pPr marL="3200400" algn="l" defTabSz="914400" rtl="0" eaLnBrk="1" latinLnBrk="0" hangingPunct="1">
+              <a:defRPr sz="1800" kern="1200">
+                <a:solidFill>
+                  <a:schemeClr val="tx1"/>
+                </a:solidFill>
+                <a:latin typeface="+mn-lt"/>
+                <a:ea typeface="+mn-ea"/>
+                <a:cs typeface="+mn-cs"/>
+              </a:defRPr>
+            </a:lvl8pPr>
+            <a:lvl9pPr marL="3657600" algn="l" defTabSz="914400" rtl="0" eaLnBrk="1" latinLnBrk="0" hangingPunct="1">
+              <a:defRPr sz="1800" kern="1200">
+                <a:solidFill>
+                  <a:schemeClr val="tx1"/>
+                </a:solidFill>
+                <a:latin typeface="+mn-lt"/>
+                <a:ea typeface="+mn-ea"/>
+                <a:cs typeface="+mn-cs"/>
+              </a:defRPr>
+            </a:lvl9pPr>
+          </a:lstStyle>
+          <a:p>
+            <a:r>
+              <a:rPr lang="en-US" sz="1600" b="1" dirty="0"/>
+              <a:t>&lt;bcl files&gt;</a:t>
+            </a:r>
+            <a:br>
+              <a:rPr lang="en-US" sz="1600" b="1" dirty="0"/>
+            </a:br>
+            <a:r>
+              <a:rPr lang="nb-NO" sz="1600" b="1" dirty="0"/>
+              <a:t>tar at lane level</a:t>
+            </a:r>
+            <a:br>
+              <a:rPr lang="nb-NO" sz="1600" b="1" dirty="0"/>
+            </a:br>
+            <a:r>
+              <a:rPr lang="nb-NO" sz="1600" b="1" dirty="0"/>
+              <a:t>ex. L001.tar</a:t>
+            </a:r>
+            <a:endParaRPr lang="en-US" sz="1600" b="1" dirty="0"/>
+          </a:p>
+        </p:txBody>
+      </p:sp>
+      <p:sp>
+        <p:nvSpPr>
+          <p:cNvPr id="25" name="TextBox 56">
+            <a:extLst>
+              <a:ext uri="{FF2B5EF4-FFF2-40B4-BE49-F238E27FC236}">
+                <a16:creationId xmlns:a16="http://schemas.microsoft.com/office/drawing/2014/main" id="{1D3FBA24-D386-44E6-8159-8170C4879725}"/>
+              </a:ext>
+            </a:extLst>
+          </p:cNvPr>
+          <p:cNvSpPr txBox="1"/>
+          <p:nvPr/>
+        </p:nvSpPr>
+        <p:spPr>
+          <a:xfrm>
+            <a:off x="9148126" y="2553313"/>
+            <a:ext cx="1527662" cy="338554"/>
+          </a:xfrm>
+          <a:prstGeom prst="rect">
+            <a:avLst/>
+          </a:prstGeom>
+          <a:noFill/>
+        </p:spPr>
+        <p:txBody>
+          <a:bodyPr wrap="square" rtlCol="0">
+            <a:spAutoFit/>
+          </a:bodyPr>
+          <a:lstStyle>
+            <a:defPPr>
+              <a:defRPr lang="en-US"/>
+            </a:defPPr>
+            <a:lvl1pPr marL="0" algn="l" defTabSz="914400" rtl="0" eaLnBrk="1" latinLnBrk="0" hangingPunct="1">
+              <a:defRPr sz="1800" kern="1200">
+                <a:solidFill>
+                  <a:schemeClr val="tx1"/>
+                </a:solidFill>
+                <a:latin typeface="+mn-lt"/>
+                <a:ea typeface="+mn-ea"/>
+                <a:cs typeface="+mn-cs"/>
+              </a:defRPr>
+            </a:lvl1pPr>
+            <a:lvl2pPr marL="457200" algn="l" defTabSz="914400" rtl="0" eaLnBrk="1" latinLnBrk="0" hangingPunct="1">
+              <a:defRPr sz="1800" kern="1200">
+                <a:solidFill>
+                  <a:schemeClr val="tx1"/>
+                </a:solidFill>
+                <a:latin typeface="+mn-lt"/>
+                <a:ea typeface="+mn-ea"/>
+                <a:cs typeface="+mn-cs"/>
+              </a:defRPr>
+            </a:lvl2pPr>
+            <a:lvl3pPr marL="914400" algn="l" defTabSz="914400" rtl="0" eaLnBrk="1" latinLnBrk="0" hangingPunct="1">
+              <a:defRPr sz="1800" kern="1200">
+                <a:solidFill>
+                  <a:schemeClr val="tx1"/>
+                </a:solidFill>
+                <a:latin typeface="+mn-lt"/>
+                <a:ea typeface="+mn-ea"/>
+                <a:cs typeface="+mn-cs"/>
+              </a:defRPr>
+            </a:lvl3pPr>
+            <a:lvl4pPr marL="1371600" algn="l" defTabSz="914400" rtl="0" eaLnBrk="1" latinLnBrk="0" hangingPunct="1">
+              <a:defRPr sz="1800" kern="1200">
+                <a:solidFill>
+                  <a:schemeClr val="tx1"/>
+                </a:solidFill>
+                <a:latin typeface="+mn-lt"/>
+                <a:ea typeface="+mn-ea"/>
+                <a:cs typeface="+mn-cs"/>
+              </a:defRPr>
+            </a:lvl4pPr>
+            <a:lvl5pPr marL="1828800" algn="l" defTabSz="914400" rtl="0" eaLnBrk="1" latinLnBrk="0" hangingPunct="1">
+              <a:defRPr sz="1800" kern="1200">
+                <a:solidFill>
+                  <a:schemeClr val="tx1"/>
+                </a:solidFill>
+                <a:latin typeface="+mn-lt"/>
+                <a:ea typeface="+mn-ea"/>
+                <a:cs typeface="+mn-cs"/>
+              </a:defRPr>
+            </a:lvl5pPr>
+            <a:lvl6pPr marL="2286000" algn="l" defTabSz="914400" rtl="0" eaLnBrk="1" latinLnBrk="0" hangingPunct="1">
+              <a:defRPr sz="1800" kern="1200">
+                <a:solidFill>
+                  <a:schemeClr val="tx1"/>
+                </a:solidFill>
+                <a:latin typeface="+mn-lt"/>
+                <a:ea typeface="+mn-ea"/>
+                <a:cs typeface="+mn-cs"/>
+              </a:defRPr>
+            </a:lvl6pPr>
+            <a:lvl7pPr marL="2743200" algn="l" defTabSz="914400" rtl="0" eaLnBrk="1" latinLnBrk="0" hangingPunct="1">
+              <a:defRPr sz="1800" kern="1200">
+                <a:solidFill>
+                  <a:schemeClr val="tx1"/>
+                </a:solidFill>
+                <a:latin typeface="+mn-lt"/>
+                <a:ea typeface="+mn-ea"/>
+                <a:cs typeface="+mn-cs"/>
+              </a:defRPr>
+            </a:lvl7pPr>
+            <a:lvl8pPr marL="3200400" algn="l" defTabSz="914400" rtl="0" eaLnBrk="1" latinLnBrk="0" hangingPunct="1">
+              <a:defRPr sz="1800" kern="1200">
+                <a:solidFill>
+                  <a:schemeClr val="tx1"/>
+                </a:solidFill>
+                <a:latin typeface="+mn-lt"/>
+                <a:ea typeface="+mn-ea"/>
+                <a:cs typeface="+mn-cs"/>
+              </a:defRPr>
+            </a:lvl8pPr>
+            <a:lvl9pPr marL="3657600" algn="l" defTabSz="914400" rtl="0" eaLnBrk="1" latinLnBrk="0" hangingPunct="1">
+              <a:defRPr sz="1800" kern="1200">
+                <a:solidFill>
+                  <a:schemeClr val="tx1"/>
+                </a:solidFill>
+                <a:latin typeface="+mn-lt"/>
+                <a:ea typeface="+mn-ea"/>
+                <a:cs typeface="+mn-cs"/>
+              </a:defRPr>
+            </a:lvl9pPr>
+          </a:lstStyle>
+          <a:p>
+            <a:r>
+              <a:rPr lang="en-US" sz="1600" b="1" dirty="0"/>
+              <a:t>&lt;fastq files&gt;</a:t>
+            </a:r>
+          </a:p>
+        </p:txBody>
+      </p:sp>
+      <p:cxnSp>
+        <p:nvCxnSpPr>
+          <p:cNvPr id="35" name="Connector: Elbow 34">
+            <a:extLst>
+              <a:ext uri="{FF2B5EF4-FFF2-40B4-BE49-F238E27FC236}">
+                <a16:creationId xmlns:a16="http://schemas.microsoft.com/office/drawing/2014/main" id="{D54615C4-0F7F-4CD4-A1DA-8D6BCDAC2001}"/>
+              </a:ext>
+            </a:extLst>
+          </p:cNvPr>
+          <p:cNvCxnSpPr>
+            <a:cxnSpLocks/>
+            <a:stCxn id="23" idx="3"/>
+            <a:endCxn id="22" idx="1"/>
+          </p:cNvCxnSpPr>
+          <p:nvPr/>
+        </p:nvCxnSpPr>
+        <p:spPr>
+          <a:xfrm>
+            <a:off x="5269176" y="1298083"/>
+            <a:ext cx="528146" cy="250838"/>
+          </a:xfrm>
+          <a:prstGeom prst="bentConnector3">
+            <a:avLst/>
+          </a:prstGeom>
+          <a:ln>
+            <a:tailEnd type="triangle"/>
+          </a:ln>
+        </p:spPr>
+        <p:style>
+          <a:lnRef idx="1">
+            <a:schemeClr val="accent1"/>
+          </a:lnRef>
+          <a:fillRef idx="0">
+            <a:schemeClr val="accent1"/>
+          </a:fillRef>
+          <a:effectRef idx="0">
+            <a:schemeClr val="accent1"/>
+          </a:effectRef>
+          <a:fontRef idx="minor">
+            <a:schemeClr val="tx1"/>
+          </a:fontRef>
+        </p:style>
+      </p:cxnSp>
+      <p:cxnSp>
+        <p:nvCxnSpPr>
+          <p:cNvPr id="42" name="Straight Arrow Connector 41">
+            <a:extLst>
+              <a:ext uri="{FF2B5EF4-FFF2-40B4-BE49-F238E27FC236}">
+                <a16:creationId xmlns:a16="http://schemas.microsoft.com/office/drawing/2014/main" id="{35D48699-EAEB-4A50-B204-D2E69C1099F6}"/>
+              </a:ext>
+            </a:extLst>
+          </p:cNvPr>
+          <p:cNvCxnSpPr>
+            <a:cxnSpLocks/>
+            <a:stCxn id="22" idx="3"/>
+          </p:cNvCxnSpPr>
+          <p:nvPr/>
+        </p:nvCxnSpPr>
+        <p:spPr>
+          <a:xfrm>
+            <a:off x="7170791" y="1548921"/>
+            <a:ext cx="1849966" cy="20015"/>
+          </a:xfrm>
+          <a:prstGeom prst="straightConnector1">
+            <a:avLst/>
+          </a:prstGeom>
+          <a:ln>
+            <a:tailEnd type="triangle"/>
+          </a:ln>
+        </p:spPr>
+        <p:style>
+          <a:lnRef idx="1">
+            <a:schemeClr val="accent1"/>
+          </a:lnRef>
+          <a:fillRef idx="0">
+            <a:schemeClr val="accent1"/>
+          </a:fillRef>
+          <a:effectRef idx="0">
+            <a:schemeClr val="accent1"/>
+          </a:effectRef>
+          <a:fontRef idx="minor">
+            <a:schemeClr val="tx1"/>
+          </a:fontRef>
+        </p:style>
+      </p:cxnSp>
+      <p:sp>
+        <p:nvSpPr>
+          <p:cNvPr id="26" name="TextBox 25">
+            <a:extLst>
+              <a:ext uri="{FF2B5EF4-FFF2-40B4-BE49-F238E27FC236}">
+                <a16:creationId xmlns:a16="http://schemas.microsoft.com/office/drawing/2014/main" id="{81F395CE-9C1E-4E84-AC50-7C8B65A2D0C8}"/>
+              </a:ext>
+            </a:extLst>
+          </p:cNvPr>
+          <p:cNvSpPr txBox="1"/>
+          <p:nvPr/>
+        </p:nvSpPr>
+        <p:spPr>
+          <a:xfrm>
+            <a:off x="9156943" y="2891867"/>
+            <a:ext cx="2461206" cy="830997"/>
+          </a:xfrm>
+          <a:prstGeom prst="rect">
+            <a:avLst/>
+          </a:prstGeom>
+          <a:noFill/>
+        </p:spPr>
+        <p:txBody>
+          <a:bodyPr wrap="square" rtlCol="0">
+            <a:spAutoFit/>
+          </a:bodyPr>
+          <a:lstStyle/>
+          <a:p>
+            <a:pPr marL="171450" indent="-171450">
+              <a:buFont typeface="Arial" panose="020B0604020202020204" pitchFamily="34" charset="0"/>
+              <a:buChar char="•"/>
+            </a:pPr>
+            <a:r>
+              <a:rPr lang="en-US" sz="1200" dirty="0">
+                <a:solidFill>
+                  <a:schemeClr val="accent1"/>
+                </a:solidFill>
+              </a:rPr>
+              <a:t>object_name</a:t>
+            </a:r>
+          </a:p>
+          <a:p>
+            <a:pPr marL="171450" indent="-171450">
+              <a:buFont typeface="Arial" panose="020B0604020202020204" pitchFamily="34" charset="0"/>
+              <a:buChar char="•"/>
+            </a:pPr>
+            <a:r>
+              <a:rPr lang="en-US" sz="1200" dirty="0">
+                <a:solidFill>
+                  <a:schemeClr val="accent1"/>
+                </a:solidFill>
+              </a:rPr>
+              <a:t>file_type</a:t>
+            </a:r>
+          </a:p>
+          <a:p>
+            <a:pPr marL="171450" indent="-171450">
+              <a:buFont typeface="Arial" panose="020B0604020202020204" pitchFamily="34" charset="0"/>
+              <a:buChar char="•"/>
+            </a:pPr>
+            <a:r>
+              <a:rPr lang="en-US" sz="1200" dirty="0">
+                <a:solidFill>
+                  <a:schemeClr val="accent1"/>
+                </a:solidFill>
+              </a:rPr>
+              <a:t>source_path</a:t>
+            </a:r>
+          </a:p>
+          <a:p>
+            <a:pPr marL="171450" indent="-171450">
+              <a:buFont typeface="Arial" panose="020B0604020202020204" pitchFamily="34" charset="0"/>
+              <a:buChar char="•"/>
+            </a:pPr>
+            <a:r>
+              <a:rPr lang="en-US" sz="1200" dirty="0">
+                <a:solidFill>
+                  <a:schemeClr val="accent1"/>
+                </a:solidFill>
+              </a:rPr>
+              <a:t>source_checksum</a:t>
+            </a:r>
+          </a:p>
+        </p:txBody>
+      </p:sp>
+      <p:sp>
+        <p:nvSpPr>
+          <p:cNvPr id="27" name="Rounded Rectangle 54">
+            <a:extLst>
+              <a:ext uri="{FF2B5EF4-FFF2-40B4-BE49-F238E27FC236}">
+                <a16:creationId xmlns:a16="http://schemas.microsoft.com/office/drawing/2014/main" id="{A57FD583-6AEB-40FB-A293-77355B2A7802}"/>
               </a:ext>
             </a:extLst>
           </p:cNvPr>
@@ -4514,8 +5172,8 @@
         </p:nvSpPr>
         <p:spPr>
           <a:xfrm>
-            <a:off x="6027961" y="3611547"/>
-            <a:ext cx="1948687" cy="523217"/>
+            <a:off x="5787070" y="2356145"/>
+            <a:ext cx="1895135" cy="665020"/>
           </a:xfrm>
           <a:prstGeom prst="roundRect">
             <a:avLst/>
@@ -4560,408 +5218,28 @@
           <a:p>
             <a:pPr algn="ctr"/>
             <a:r>
-              <a:rPr lang="en-US" b="1" dirty="0" err="1"/>
-              <a:t>Sample_X</a:t>
-            </a:r>
-            <a:endParaRPr lang="en-US" sz="1400" dirty="0">
-              <a:highlight>
-                <a:srgbClr val="FFFF00"/>
-              </a:highlight>
-            </a:endParaRPr>
-          </a:p>
-        </p:txBody>
-      </p:sp>
-      <p:sp>
-        <p:nvSpPr>
-          <p:cNvPr id="85" name="TextBox 84">
-            <a:extLst>
-              <a:ext uri="{FF2B5EF4-FFF2-40B4-BE49-F238E27FC236}">
-                <a16:creationId xmlns:a16="http://schemas.microsoft.com/office/drawing/2014/main" id="{B0127DF1-D564-294A-B2A7-D11F2DEFD395}"/>
-              </a:ext>
-            </a:extLst>
-          </p:cNvPr>
-          <p:cNvSpPr txBox="1"/>
+              <a:rPr lang="en-US" b="1" dirty="0"/>
+              <a:t>Sample_SeqDate_Flowcell</a:t>
+            </a:r>
+          </a:p>
+        </p:txBody>
+      </p:sp>
+      <p:sp>
+        <p:nvSpPr>
+          <p:cNvPr id="28" name="Rounded Rectangle 54">
+            <a:extLst>
+              <a:ext uri="{FF2B5EF4-FFF2-40B4-BE49-F238E27FC236}">
+                <a16:creationId xmlns:a16="http://schemas.microsoft.com/office/drawing/2014/main" id="{1E1BDC6B-1091-4107-AD0C-4E31A37301AB}"/>
+              </a:ext>
+            </a:extLst>
+          </p:cNvPr>
+          <p:cNvSpPr/>
           <p:nvPr/>
         </p:nvSpPr>
         <p:spPr>
           <a:xfrm>
-            <a:off x="3688795" y="3330080"/>
-            <a:ext cx="2277461" cy="461665"/>
-          </a:xfrm>
-          <a:prstGeom prst="rect">
-            <a:avLst/>
-          </a:prstGeom>
-          <a:noFill/>
-        </p:spPr>
-        <p:txBody>
-          <a:bodyPr wrap="square" rtlCol="0">
-            <a:spAutoFit/>
-          </a:bodyPr>
-          <a:lstStyle/>
-          <a:p>
-            <a:pPr marL="171450" indent="-171450">
-              <a:buFont typeface="Arial" panose="020B0604020202020204" pitchFamily="34" charset="0"/>
-              <a:buChar char="•"/>
-            </a:pPr>
-            <a:r>
-              <a:rPr lang="en-US" sz="1200" dirty="0" err="1">
-                <a:solidFill>
-                  <a:schemeClr val="accent1"/>
-                </a:solidFill>
-              </a:rPr>
-              <a:t>flowcell_id</a:t>
-            </a:r>
-            <a:endParaRPr lang="en-US" sz="1200" dirty="0">
-              <a:solidFill>
-                <a:schemeClr val="accent1"/>
-              </a:solidFill>
-            </a:endParaRPr>
-          </a:p>
-          <a:p>
-            <a:pPr marL="171450" indent="-171450">
-              <a:buFont typeface="Arial" panose="020B0604020202020204" pitchFamily="34" charset="0"/>
-              <a:buChar char="•"/>
-            </a:pPr>
-            <a:endParaRPr lang="en-US" sz="1200" dirty="0"/>
-          </a:p>
-        </p:txBody>
-      </p:sp>
-      <p:sp>
-        <p:nvSpPr>
-          <p:cNvPr id="89" name="TextBox 88">
-            <a:extLst>
-              <a:ext uri="{FF2B5EF4-FFF2-40B4-BE49-F238E27FC236}">
-                <a16:creationId xmlns:a16="http://schemas.microsoft.com/office/drawing/2014/main" id="{751366B6-4C6F-0C48-8C22-EE5FA7B09144}"/>
-              </a:ext>
-            </a:extLst>
-          </p:cNvPr>
-          <p:cNvSpPr txBox="1"/>
-          <p:nvPr/>
-        </p:nvSpPr>
-        <p:spPr>
-          <a:xfrm>
-            <a:off x="5966256" y="4286226"/>
-            <a:ext cx="2456384" cy="1938992"/>
-          </a:xfrm>
-          <a:prstGeom prst="rect">
-            <a:avLst/>
-          </a:prstGeom>
-          <a:noFill/>
-        </p:spPr>
-        <p:txBody>
-          <a:bodyPr wrap="square" rtlCol="0">
-            <a:spAutoFit/>
-          </a:bodyPr>
-          <a:lstStyle/>
-          <a:p>
-            <a:pPr marL="171450" indent="-171450">
-              <a:buFont typeface="Arial" panose="020B0604020202020204" pitchFamily="34" charset="0"/>
-              <a:buChar char="•"/>
-            </a:pPr>
-            <a:r>
-              <a:rPr lang="en-US" sz="1200" b="1" dirty="0" err="1">
-                <a:solidFill>
-                  <a:srgbClr val="FF0000"/>
-                </a:solidFill>
-              </a:rPr>
-              <a:t>assay_development_projects</a:t>
-            </a:r>
-            <a:endParaRPr lang="en-US" sz="1200" b="1" dirty="0">
-              <a:solidFill>
-                <a:srgbClr val="FF0000"/>
-              </a:solidFill>
-            </a:endParaRPr>
-          </a:p>
-          <a:p>
-            <a:pPr marL="171450" indent="-171450">
-              <a:buFont typeface="Arial" panose="020B0604020202020204" pitchFamily="34" charset="0"/>
-              <a:buChar char="•"/>
-            </a:pPr>
-            <a:r>
-              <a:rPr lang="en-US" sz="1200" dirty="0" err="1">
-                <a:solidFill>
-                  <a:srgbClr val="FF0000"/>
-                </a:solidFill>
-              </a:rPr>
-              <a:t>sample_name</a:t>
-            </a:r>
-            <a:r>
-              <a:rPr lang="en-US" sz="1200" dirty="0">
-                <a:solidFill>
-                  <a:srgbClr val="FF0000"/>
-                </a:solidFill>
-              </a:rPr>
-              <a:t>/</a:t>
-            </a:r>
-            <a:r>
-              <a:rPr lang="en-US" sz="1200" dirty="0" err="1">
-                <a:solidFill>
-                  <a:srgbClr val="FF0000"/>
-                </a:solidFill>
-              </a:rPr>
-              <a:t>sample_id</a:t>
-            </a:r>
-            <a:endParaRPr lang="en-US" sz="1200" dirty="0">
-              <a:solidFill>
-                <a:srgbClr val="FF0000"/>
-              </a:solidFill>
-            </a:endParaRPr>
-          </a:p>
-          <a:p>
-            <a:pPr marL="171450" indent="-171450">
-              <a:buFont typeface="Arial" panose="020B0604020202020204" pitchFamily="34" charset="0"/>
-              <a:buChar char="•"/>
-            </a:pPr>
-            <a:r>
-              <a:rPr lang="en-US" sz="1200" dirty="0" err="1">
-                <a:solidFill>
-                  <a:srgbClr val="00B050"/>
-                </a:solidFill>
-              </a:rPr>
-              <a:t>subject_id</a:t>
-            </a:r>
-            <a:endParaRPr lang="en-US" sz="1200" dirty="0">
-              <a:solidFill>
-                <a:srgbClr val="00B050"/>
-              </a:solidFill>
-            </a:endParaRPr>
-          </a:p>
-          <a:p>
-            <a:pPr marL="171450" indent="-171450">
-              <a:buFont typeface="Arial" panose="020B0604020202020204" pitchFamily="34" charset="0"/>
-              <a:buChar char="•"/>
-            </a:pPr>
-            <a:r>
-              <a:rPr lang="en-US" sz="1200" dirty="0">
-                <a:solidFill>
-                  <a:srgbClr val="FF0000"/>
-                </a:solidFill>
-              </a:rPr>
-              <a:t>disease</a:t>
-            </a:r>
-          </a:p>
-          <a:p>
-            <a:pPr marL="171450" indent="-171450">
-              <a:buFont typeface="Arial" panose="020B0604020202020204" pitchFamily="34" charset="0"/>
-              <a:buChar char="•"/>
-            </a:pPr>
-            <a:r>
-              <a:rPr lang="en-US" sz="1200" dirty="0" err="1">
-                <a:solidFill>
-                  <a:srgbClr val="FF0000"/>
-                </a:solidFill>
-              </a:rPr>
-              <a:t>library_strategy</a:t>
-            </a:r>
-            <a:endParaRPr lang="en-US" sz="1200" dirty="0">
-              <a:solidFill>
-                <a:srgbClr val="FF0000"/>
-              </a:solidFill>
-            </a:endParaRPr>
-          </a:p>
-          <a:p>
-            <a:pPr marL="171450" indent="-171450">
-              <a:buFont typeface="Arial" panose="020B0604020202020204" pitchFamily="34" charset="0"/>
-              <a:buChar char="•"/>
-            </a:pPr>
-            <a:r>
-              <a:rPr lang="en-US" sz="1200" dirty="0" err="1">
-                <a:solidFill>
-                  <a:srgbClr val="FF0000"/>
-                </a:solidFill>
-              </a:rPr>
-              <a:t>analyte_type</a:t>
-            </a:r>
-            <a:endParaRPr lang="en-US" sz="1200" dirty="0">
-              <a:solidFill>
-                <a:srgbClr val="FF0000"/>
-              </a:solidFill>
-            </a:endParaRPr>
-          </a:p>
-          <a:p>
-            <a:pPr marL="171450" indent="-171450">
-              <a:buFont typeface="Arial" panose="020B0604020202020204" pitchFamily="34" charset="0"/>
-              <a:buChar char="•"/>
-            </a:pPr>
-            <a:r>
-              <a:rPr lang="en-US" sz="1200" dirty="0">
-                <a:solidFill>
-                  <a:srgbClr val="00B050"/>
-                </a:solidFill>
-              </a:rPr>
-              <a:t>tissue</a:t>
-            </a:r>
-          </a:p>
-          <a:p>
-            <a:pPr marL="171450" indent="-171450">
-              <a:buFont typeface="Arial" panose="020B0604020202020204" pitchFamily="34" charset="0"/>
-              <a:buChar char="•"/>
-            </a:pPr>
-            <a:r>
-              <a:rPr lang="en-US" sz="1200" dirty="0" err="1">
-                <a:solidFill>
-                  <a:srgbClr val="00B050"/>
-                </a:solidFill>
-              </a:rPr>
-              <a:t>tissue_type</a:t>
-            </a:r>
-            <a:endParaRPr lang="en-US" sz="1200" dirty="0">
-              <a:solidFill>
-                <a:srgbClr val="00B050"/>
-              </a:solidFill>
-            </a:endParaRPr>
-          </a:p>
-          <a:p>
-            <a:pPr marL="171450" indent="-171450">
-              <a:buFont typeface="Arial" panose="020B0604020202020204" pitchFamily="34" charset="0"/>
-              <a:buChar char="•"/>
-            </a:pPr>
-            <a:r>
-              <a:rPr lang="en-US" sz="1200" dirty="0">
-                <a:solidFill>
-                  <a:srgbClr val="00B050"/>
-                </a:solidFill>
-              </a:rPr>
-              <a:t>age</a:t>
-            </a:r>
-          </a:p>
-          <a:p>
-            <a:pPr marL="171450" indent="-171450">
-              <a:buFont typeface="Arial" panose="020B0604020202020204" pitchFamily="34" charset="0"/>
-              <a:buChar char="•"/>
-            </a:pPr>
-            <a:r>
-              <a:rPr lang="en-US" sz="1200" dirty="0">
-                <a:solidFill>
-                  <a:srgbClr val="00B050"/>
-                </a:solidFill>
-              </a:rPr>
-              <a:t>gender</a:t>
-            </a:r>
-          </a:p>
-        </p:txBody>
-      </p:sp>
-      <p:sp>
-        <p:nvSpPr>
-          <p:cNvPr id="99" name="TextBox 98">
-            <a:extLst>
-              <a:ext uri="{FF2B5EF4-FFF2-40B4-BE49-F238E27FC236}">
-                <a16:creationId xmlns:a16="http://schemas.microsoft.com/office/drawing/2014/main" id="{7CC9A911-B0A7-AF46-8C4C-518D3F4D6528}"/>
-              </a:ext>
-            </a:extLst>
-          </p:cNvPr>
-          <p:cNvSpPr txBox="1"/>
-          <p:nvPr/>
-        </p:nvSpPr>
-        <p:spPr>
-          <a:xfrm>
-            <a:off x="9402490" y="2360584"/>
-            <a:ext cx="2461206" cy="830997"/>
-          </a:xfrm>
-          <a:prstGeom prst="rect">
-            <a:avLst/>
-          </a:prstGeom>
-          <a:noFill/>
-        </p:spPr>
-        <p:txBody>
-          <a:bodyPr wrap="square" rtlCol="0">
-            <a:spAutoFit/>
-          </a:bodyPr>
-          <a:lstStyle/>
-          <a:p>
-            <a:pPr marL="171450" indent="-171450">
-              <a:buFont typeface="Arial" panose="020B0604020202020204" pitchFamily="34" charset="0"/>
-              <a:buChar char="•"/>
-            </a:pPr>
-            <a:r>
-              <a:rPr lang="en-US" sz="1200" dirty="0" err="1">
-                <a:solidFill>
-                  <a:schemeClr val="accent1"/>
-                </a:solidFill>
-              </a:rPr>
-              <a:t>object_name</a:t>
-            </a:r>
-            <a:endParaRPr lang="en-US" sz="1200" dirty="0">
-              <a:solidFill>
-                <a:schemeClr val="accent1"/>
-              </a:solidFill>
-            </a:endParaRPr>
-          </a:p>
-          <a:p>
-            <a:pPr marL="171450" indent="-171450">
-              <a:buFont typeface="Arial" panose="020B0604020202020204" pitchFamily="34" charset="0"/>
-              <a:buChar char="•"/>
-            </a:pPr>
-            <a:r>
-              <a:rPr lang="en-US" sz="1200" dirty="0" err="1">
-                <a:solidFill>
-                  <a:schemeClr val="accent1"/>
-                </a:solidFill>
-              </a:rPr>
-              <a:t>file_type</a:t>
-            </a:r>
-            <a:endParaRPr lang="en-US" sz="1200" dirty="0">
-              <a:solidFill>
-                <a:schemeClr val="accent1"/>
-              </a:solidFill>
-            </a:endParaRPr>
-          </a:p>
-          <a:p>
-            <a:pPr marL="171450" indent="-171450">
-              <a:buFont typeface="Arial" panose="020B0604020202020204" pitchFamily="34" charset="0"/>
-              <a:buChar char="•"/>
-            </a:pPr>
-            <a:r>
-              <a:rPr lang="en-US" sz="1200" dirty="0" err="1">
-                <a:solidFill>
-                  <a:schemeClr val="accent1"/>
-                </a:solidFill>
-              </a:rPr>
-              <a:t>source_path</a:t>
-            </a:r>
-            <a:endParaRPr lang="en-US" sz="1200" dirty="0">
-              <a:solidFill>
-                <a:schemeClr val="accent1"/>
-              </a:solidFill>
-            </a:endParaRPr>
-          </a:p>
-          <a:p>
-            <a:pPr marL="171450" indent="-171450">
-              <a:buFont typeface="Arial" panose="020B0604020202020204" pitchFamily="34" charset="0"/>
-              <a:buChar char="•"/>
-            </a:pPr>
-            <a:r>
-              <a:rPr lang="en-US" sz="1200" dirty="0" err="1">
-                <a:solidFill>
-                  <a:schemeClr val="accent1"/>
-                </a:solidFill>
-              </a:rPr>
-              <a:t>source_checksum</a:t>
-            </a:r>
-            <a:endParaRPr lang="en-US" sz="1200" dirty="0">
-              <a:solidFill>
-                <a:schemeClr val="accent1"/>
-              </a:solidFill>
-            </a:endParaRPr>
-          </a:p>
-        </p:txBody>
-      </p:sp>
-      <p:sp>
-        <p:nvSpPr>
-          <p:cNvPr id="22" name="Rounded Rectangle 54">
-            <a:extLst>
-              <a:ext uri="{FF2B5EF4-FFF2-40B4-BE49-F238E27FC236}">
-                <a16:creationId xmlns:a16="http://schemas.microsoft.com/office/drawing/2014/main" id="{0FADA1C4-3F77-4727-8E6A-533BBA61DE6B}"/>
-              </a:ext>
-            </a:extLst>
-          </p:cNvPr>
-          <p:cNvSpPr/>
-          <p:nvPr/>
-        </p:nvSpPr>
-        <p:spPr>
-          <a:xfrm>
-            <a:off x="6027960" y="1668015"/>
-            <a:ext cx="1948687" cy="543810"/>
+            <a:off x="1146592" y="1453103"/>
+            <a:ext cx="1788520" cy="789723"/>
           </a:xfrm>
           <a:prstGeom prst="roundRect">
             <a:avLst/>
@@ -5007,7 +5285,7 @@
             <a:pPr algn="ctr"/>
             <a:r>
               <a:rPr lang="en-US" b="1" dirty="0"/>
-              <a:t>BCL</a:t>
+              <a:t>Platform (HiSeq, NovaSeq)</a:t>
             </a:r>
             <a:endParaRPr lang="en-US" sz="1400" dirty="0">
               <a:highlight>
@@ -5017,315 +5295,26 @@
           </a:p>
         </p:txBody>
       </p:sp>
-      <p:sp>
-        <p:nvSpPr>
-          <p:cNvPr id="24" name="TextBox 56">
-            <a:extLst>
-              <a:ext uri="{FF2B5EF4-FFF2-40B4-BE49-F238E27FC236}">
-                <a16:creationId xmlns:a16="http://schemas.microsoft.com/office/drawing/2014/main" id="{E204D8E5-D09A-B845-9062-DC21BE061833}"/>
-              </a:ext>
-            </a:extLst>
-          </p:cNvPr>
-          <p:cNvSpPr txBox="1"/>
-          <p:nvPr/>
-        </p:nvSpPr>
-        <p:spPr>
-          <a:xfrm>
-            <a:off x="9279080" y="1524421"/>
-            <a:ext cx="2446574" cy="830997"/>
-          </a:xfrm>
-          <a:prstGeom prst="rect">
-            <a:avLst/>
-          </a:prstGeom>
-          <a:noFill/>
-        </p:spPr>
-        <p:txBody>
-          <a:bodyPr wrap="square" rtlCol="0">
-            <a:spAutoFit/>
-          </a:bodyPr>
-          <a:lstStyle>
-            <a:defPPr>
-              <a:defRPr lang="en-US"/>
-            </a:defPPr>
-            <a:lvl1pPr marL="0" algn="l" defTabSz="914400" rtl="0" eaLnBrk="1" latinLnBrk="0" hangingPunct="1">
-              <a:defRPr sz="1800" kern="1200">
-                <a:solidFill>
-                  <a:schemeClr val="tx1"/>
-                </a:solidFill>
-                <a:latin typeface="+mn-lt"/>
-                <a:ea typeface="+mn-ea"/>
-                <a:cs typeface="+mn-cs"/>
-              </a:defRPr>
-            </a:lvl1pPr>
-            <a:lvl2pPr marL="457200" algn="l" defTabSz="914400" rtl="0" eaLnBrk="1" latinLnBrk="0" hangingPunct="1">
-              <a:defRPr sz="1800" kern="1200">
-                <a:solidFill>
-                  <a:schemeClr val="tx1"/>
-                </a:solidFill>
-                <a:latin typeface="+mn-lt"/>
-                <a:ea typeface="+mn-ea"/>
-                <a:cs typeface="+mn-cs"/>
-              </a:defRPr>
-            </a:lvl2pPr>
-            <a:lvl3pPr marL="914400" algn="l" defTabSz="914400" rtl="0" eaLnBrk="1" latinLnBrk="0" hangingPunct="1">
-              <a:defRPr sz="1800" kern="1200">
-                <a:solidFill>
-                  <a:schemeClr val="tx1"/>
-                </a:solidFill>
-                <a:latin typeface="+mn-lt"/>
-                <a:ea typeface="+mn-ea"/>
-                <a:cs typeface="+mn-cs"/>
-              </a:defRPr>
-            </a:lvl3pPr>
-            <a:lvl4pPr marL="1371600" algn="l" defTabSz="914400" rtl="0" eaLnBrk="1" latinLnBrk="0" hangingPunct="1">
-              <a:defRPr sz="1800" kern="1200">
-                <a:solidFill>
-                  <a:schemeClr val="tx1"/>
-                </a:solidFill>
-                <a:latin typeface="+mn-lt"/>
-                <a:ea typeface="+mn-ea"/>
-                <a:cs typeface="+mn-cs"/>
-              </a:defRPr>
-            </a:lvl4pPr>
-            <a:lvl5pPr marL="1828800" algn="l" defTabSz="914400" rtl="0" eaLnBrk="1" latinLnBrk="0" hangingPunct="1">
-              <a:defRPr sz="1800" kern="1200">
-                <a:solidFill>
-                  <a:schemeClr val="tx1"/>
-                </a:solidFill>
-                <a:latin typeface="+mn-lt"/>
-                <a:ea typeface="+mn-ea"/>
-                <a:cs typeface="+mn-cs"/>
-              </a:defRPr>
-            </a:lvl5pPr>
-            <a:lvl6pPr marL="2286000" algn="l" defTabSz="914400" rtl="0" eaLnBrk="1" latinLnBrk="0" hangingPunct="1">
-              <a:defRPr sz="1800" kern="1200">
-                <a:solidFill>
-                  <a:schemeClr val="tx1"/>
-                </a:solidFill>
-                <a:latin typeface="+mn-lt"/>
-                <a:ea typeface="+mn-ea"/>
-                <a:cs typeface="+mn-cs"/>
-              </a:defRPr>
-            </a:lvl6pPr>
-            <a:lvl7pPr marL="2743200" algn="l" defTabSz="914400" rtl="0" eaLnBrk="1" latinLnBrk="0" hangingPunct="1">
-              <a:defRPr sz="1800" kern="1200">
-                <a:solidFill>
-                  <a:schemeClr val="tx1"/>
-                </a:solidFill>
-                <a:latin typeface="+mn-lt"/>
-                <a:ea typeface="+mn-ea"/>
-                <a:cs typeface="+mn-cs"/>
-              </a:defRPr>
-            </a:lvl7pPr>
-            <a:lvl8pPr marL="3200400" algn="l" defTabSz="914400" rtl="0" eaLnBrk="1" latinLnBrk="0" hangingPunct="1">
-              <a:defRPr sz="1800" kern="1200">
-                <a:solidFill>
-                  <a:schemeClr val="tx1"/>
-                </a:solidFill>
-                <a:latin typeface="+mn-lt"/>
-                <a:ea typeface="+mn-ea"/>
-                <a:cs typeface="+mn-cs"/>
-              </a:defRPr>
-            </a:lvl8pPr>
-            <a:lvl9pPr marL="3657600" algn="l" defTabSz="914400" rtl="0" eaLnBrk="1" latinLnBrk="0" hangingPunct="1">
-              <a:defRPr sz="1800" kern="1200">
-                <a:solidFill>
-                  <a:schemeClr val="tx1"/>
-                </a:solidFill>
-                <a:latin typeface="+mn-lt"/>
-                <a:ea typeface="+mn-ea"/>
-                <a:cs typeface="+mn-cs"/>
-              </a:defRPr>
-            </a:lvl9pPr>
-          </a:lstStyle>
-          <a:p>
-            <a:r>
-              <a:rPr lang="en-US" sz="1600" b="1" dirty="0"/>
-              <a:t>&lt;</a:t>
-            </a:r>
-            <a:r>
-              <a:rPr lang="en-US" sz="1600" b="1" dirty="0" err="1"/>
-              <a:t>bcl</a:t>
-            </a:r>
-            <a:r>
-              <a:rPr lang="en-US" sz="1600" b="1" dirty="0"/>
-              <a:t> files&gt;</a:t>
-            </a:r>
-            <a:br>
-              <a:rPr lang="en-US" sz="1600" b="1" dirty="0"/>
-            </a:br>
-            <a:r>
-              <a:rPr lang="nb-NO" sz="1600" b="1" dirty="0"/>
-              <a:t>tar at lane level</a:t>
-            </a:r>
-            <a:br>
-              <a:rPr lang="nb-NO" sz="1600" b="1" dirty="0"/>
-            </a:br>
-            <a:r>
-              <a:rPr lang="nb-NO" sz="1600" b="1" dirty="0"/>
-              <a:t>ex. L001.tar</a:t>
-            </a:r>
-            <a:endParaRPr lang="en-US" sz="1600" b="1" dirty="0"/>
-          </a:p>
-        </p:txBody>
-      </p:sp>
-      <p:sp>
-        <p:nvSpPr>
-          <p:cNvPr id="25" name="TextBox 56">
-            <a:extLst>
-              <a:ext uri="{FF2B5EF4-FFF2-40B4-BE49-F238E27FC236}">
-                <a16:creationId xmlns:a16="http://schemas.microsoft.com/office/drawing/2014/main" id="{1D3FBA24-D386-44E6-8159-8170C4879725}"/>
-              </a:ext>
-            </a:extLst>
-          </p:cNvPr>
-          <p:cNvSpPr txBox="1"/>
-          <p:nvPr/>
-        </p:nvSpPr>
-        <p:spPr>
-          <a:xfrm>
-            <a:off x="9334173" y="3669265"/>
-            <a:ext cx="1527662" cy="338554"/>
-          </a:xfrm>
-          <a:prstGeom prst="rect">
-            <a:avLst/>
-          </a:prstGeom>
-          <a:noFill/>
-        </p:spPr>
-        <p:txBody>
-          <a:bodyPr wrap="square" rtlCol="0">
-            <a:spAutoFit/>
-          </a:bodyPr>
-          <a:lstStyle>
-            <a:defPPr>
-              <a:defRPr lang="en-US"/>
-            </a:defPPr>
-            <a:lvl1pPr marL="0" algn="l" defTabSz="914400" rtl="0" eaLnBrk="1" latinLnBrk="0" hangingPunct="1">
-              <a:defRPr sz="1800" kern="1200">
-                <a:solidFill>
-                  <a:schemeClr val="tx1"/>
-                </a:solidFill>
-                <a:latin typeface="+mn-lt"/>
-                <a:ea typeface="+mn-ea"/>
-                <a:cs typeface="+mn-cs"/>
-              </a:defRPr>
-            </a:lvl1pPr>
-            <a:lvl2pPr marL="457200" algn="l" defTabSz="914400" rtl="0" eaLnBrk="1" latinLnBrk="0" hangingPunct="1">
-              <a:defRPr sz="1800" kern="1200">
-                <a:solidFill>
-                  <a:schemeClr val="tx1"/>
-                </a:solidFill>
-                <a:latin typeface="+mn-lt"/>
-                <a:ea typeface="+mn-ea"/>
-                <a:cs typeface="+mn-cs"/>
-              </a:defRPr>
-            </a:lvl2pPr>
-            <a:lvl3pPr marL="914400" algn="l" defTabSz="914400" rtl="0" eaLnBrk="1" latinLnBrk="0" hangingPunct="1">
-              <a:defRPr sz="1800" kern="1200">
-                <a:solidFill>
-                  <a:schemeClr val="tx1"/>
-                </a:solidFill>
-                <a:latin typeface="+mn-lt"/>
-                <a:ea typeface="+mn-ea"/>
-                <a:cs typeface="+mn-cs"/>
-              </a:defRPr>
-            </a:lvl3pPr>
-            <a:lvl4pPr marL="1371600" algn="l" defTabSz="914400" rtl="0" eaLnBrk="1" latinLnBrk="0" hangingPunct="1">
-              <a:defRPr sz="1800" kern="1200">
-                <a:solidFill>
-                  <a:schemeClr val="tx1"/>
-                </a:solidFill>
-                <a:latin typeface="+mn-lt"/>
-                <a:ea typeface="+mn-ea"/>
-                <a:cs typeface="+mn-cs"/>
-              </a:defRPr>
-            </a:lvl4pPr>
-            <a:lvl5pPr marL="1828800" algn="l" defTabSz="914400" rtl="0" eaLnBrk="1" latinLnBrk="0" hangingPunct="1">
-              <a:defRPr sz="1800" kern="1200">
-                <a:solidFill>
-                  <a:schemeClr val="tx1"/>
-                </a:solidFill>
-                <a:latin typeface="+mn-lt"/>
-                <a:ea typeface="+mn-ea"/>
-                <a:cs typeface="+mn-cs"/>
-              </a:defRPr>
-            </a:lvl5pPr>
-            <a:lvl6pPr marL="2286000" algn="l" defTabSz="914400" rtl="0" eaLnBrk="1" latinLnBrk="0" hangingPunct="1">
-              <a:defRPr sz="1800" kern="1200">
-                <a:solidFill>
-                  <a:schemeClr val="tx1"/>
-                </a:solidFill>
-                <a:latin typeface="+mn-lt"/>
-                <a:ea typeface="+mn-ea"/>
-                <a:cs typeface="+mn-cs"/>
-              </a:defRPr>
-            </a:lvl6pPr>
-            <a:lvl7pPr marL="2743200" algn="l" defTabSz="914400" rtl="0" eaLnBrk="1" latinLnBrk="0" hangingPunct="1">
-              <a:defRPr sz="1800" kern="1200">
-                <a:solidFill>
-                  <a:schemeClr val="tx1"/>
-                </a:solidFill>
-                <a:latin typeface="+mn-lt"/>
-                <a:ea typeface="+mn-ea"/>
-                <a:cs typeface="+mn-cs"/>
-              </a:defRPr>
-            </a:lvl7pPr>
-            <a:lvl8pPr marL="3200400" algn="l" defTabSz="914400" rtl="0" eaLnBrk="1" latinLnBrk="0" hangingPunct="1">
-              <a:defRPr sz="1800" kern="1200">
-                <a:solidFill>
-                  <a:schemeClr val="tx1"/>
-                </a:solidFill>
-                <a:latin typeface="+mn-lt"/>
-                <a:ea typeface="+mn-ea"/>
-                <a:cs typeface="+mn-cs"/>
-              </a:defRPr>
-            </a:lvl8pPr>
-            <a:lvl9pPr marL="3657600" algn="l" defTabSz="914400" rtl="0" eaLnBrk="1" latinLnBrk="0" hangingPunct="1">
-              <a:defRPr sz="1800" kern="1200">
-                <a:solidFill>
-                  <a:schemeClr val="tx1"/>
-                </a:solidFill>
-                <a:latin typeface="+mn-lt"/>
-                <a:ea typeface="+mn-ea"/>
-                <a:cs typeface="+mn-cs"/>
-              </a:defRPr>
-            </a:lvl9pPr>
-          </a:lstStyle>
-          <a:p>
-            <a:r>
-              <a:rPr lang="en-US" sz="1600" b="1" dirty="0"/>
-              <a:t>&lt;</a:t>
-            </a:r>
-            <a:r>
-              <a:rPr lang="en-US" sz="1600" b="1" dirty="0" err="1"/>
-              <a:t>fastq</a:t>
-            </a:r>
-            <a:r>
-              <a:rPr lang="en-US" sz="1600" b="1" dirty="0"/>
-              <a:t> files&gt;</a:t>
-            </a:r>
-          </a:p>
-        </p:txBody>
-      </p:sp>
       <p:cxnSp>
         <p:nvCxnSpPr>
-          <p:cNvPr id="9" name="Connector: Elbow 8">
-            <a:extLst>
-              <a:ext uri="{FF2B5EF4-FFF2-40B4-BE49-F238E27FC236}">
-                <a16:creationId xmlns:a16="http://schemas.microsoft.com/office/drawing/2014/main" id="{7EBA83F5-C87A-4B19-8E8A-293CC7A8DC24}"/>
+          <p:cNvPr id="12" name="Connector: Elbow 11">
+            <a:extLst>
+              <a:ext uri="{FF2B5EF4-FFF2-40B4-BE49-F238E27FC236}">
+                <a16:creationId xmlns:a16="http://schemas.microsoft.com/office/drawing/2014/main" id="{3E917F41-9F94-418A-958C-8A2DBFD7907B}"/>
               </a:ext>
             </a:extLst>
           </p:cNvPr>
           <p:cNvCxnSpPr>
             <a:cxnSpLocks/>
             <a:stCxn id="4" idx="2"/>
-            <a:endCxn id="5" idx="1"/>
+            <a:endCxn id="28" idx="1"/>
           </p:cNvCxnSpPr>
           <p:nvPr/>
         </p:nvCxnSpPr>
         <p:spPr>
           <a:xfrm rot="16200000" flipH="1">
-            <a:off x="643021" y="1465410"/>
-            <a:ext cx="821389" cy="548143"/>
+            <a:off x="435334" y="1136707"/>
+            <a:ext cx="1071744" cy="350772"/>
           </a:xfrm>
           <a:prstGeom prst="bentConnector2">
             <a:avLst/>
@@ -5349,29 +5338,432 @@
           </a:fontRef>
         </p:style>
       </p:cxnSp>
+      <p:sp>
+        <p:nvSpPr>
+          <p:cNvPr id="52" name="TextBox 51">
+            <a:extLst>
+              <a:ext uri="{FF2B5EF4-FFF2-40B4-BE49-F238E27FC236}">
+                <a16:creationId xmlns:a16="http://schemas.microsoft.com/office/drawing/2014/main" id="{94A2F0EA-811B-4DA2-BF27-8F58692DCFB7}"/>
+              </a:ext>
+            </a:extLst>
+          </p:cNvPr>
+          <p:cNvSpPr txBox="1"/>
+          <p:nvPr/>
+        </p:nvSpPr>
+        <p:spPr>
+          <a:xfrm>
+            <a:off x="5787070" y="3057883"/>
+            <a:ext cx="2568144" cy="2308324"/>
+          </a:xfrm>
+          <a:prstGeom prst="rect">
+            <a:avLst/>
+          </a:prstGeom>
+          <a:noFill/>
+        </p:spPr>
+        <p:txBody>
+          <a:bodyPr wrap="square" rtlCol="0">
+            <a:spAutoFit/>
+          </a:bodyPr>
+          <a:lstStyle/>
+          <a:p>
+            <a:pPr marL="171450" indent="-171450">
+              <a:buFont typeface="Arial" panose="020B0604020202020204" pitchFamily="34" charset="0"/>
+              <a:buChar char="•"/>
+            </a:pPr>
+            <a:r>
+              <a:rPr lang="en-US" sz="1200" dirty="0">
+                <a:solidFill>
+                  <a:schemeClr val="accent1"/>
+                </a:solidFill>
+              </a:rPr>
+              <a:t>flowcell_id</a:t>
+            </a:r>
+          </a:p>
+          <a:p>
+            <a:pPr marL="171450" indent="-171450">
+              <a:buFont typeface="Arial" panose="020B0604020202020204" pitchFamily="34" charset="0"/>
+              <a:buChar char="•"/>
+            </a:pPr>
+            <a:r>
+              <a:rPr lang="en-US" sz="1200" dirty="0">
+                <a:solidFill>
+                  <a:schemeClr val="accent1"/>
+                </a:solidFill>
+              </a:rPr>
+              <a:t>run_id</a:t>
+            </a:r>
+          </a:p>
+          <a:p>
+            <a:pPr marL="171450" indent="-171450">
+              <a:buFont typeface="Arial" panose="020B0604020202020204" pitchFamily="34" charset="0"/>
+              <a:buChar char="•"/>
+            </a:pPr>
+            <a:r>
+              <a:rPr lang="en-US" sz="1200" dirty="0"/>
+              <a:t>library_strategy</a:t>
+            </a:r>
+          </a:p>
+          <a:p>
+            <a:pPr marL="171450" indent="-171450">
+              <a:buFont typeface="Arial" panose="020B0604020202020204" pitchFamily="34" charset="0"/>
+              <a:buChar char="•"/>
+            </a:pPr>
+            <a:r>
+              <a:rPr lang="en-US" sz="1200" dirty="0"/>
+              <a:t>analyte_type</a:t>
+            </a:r>
+          </a:p>
+          <a:p>
+            <a:pPr marL="171450" indent="-171450">
+              <a:buFont typeface="Arial" panose="020B0604020202020204" pitchFamily="34" charset="0"/>
+              <a:buChar char="•"/>
+            </a:pPr>
+            <a:r>
+              <a:rPr lang="en-US" sz="1200" dirty="0"/>
+              <a:t>sample_name/sample_id</a:t>
+            </a:r>
+          </a:p>
+          <a:p>
+            <a:pPr marL="171450" indent="-171450">
+              <a:buFont typeface="Arial" panose="020B0604020202020204" pitchFamily="34" charset="0"/>
+              <a:buChar char="•"/>
+            </a:pPr>
+            <a:r>
+              <a:rPr lang="en-US" sz="1200" dirty="0"/>
+              <a:t>flowcell_lane</a:t>
+            </a:r>
+          </a:p>
+          <a:p>
+            <a:pPr marL="171450" indent="-171450">
+              <a:buFont typeface="Arial" panose="020B0604020202020204" pitchFamily="34" charset="0"/>
+              <a:buChar char="•"/>
+            </a:pPr>
+            <a:r>
+              <a:rPr lang="en-US" sz="1200" dirty="0">
+                <a:solidFill>
+                  <a:schemeClr val="accent6"/>
+                </a:solidFill>
+              </a:rPr>
+              <a:t>tissue (or cell_line_name)</a:t>
+            </a:r>
+          </a:p>
+          <a:p>
+            <a:pPr marL="171450" indent="-171450">
+              <a:buFont typeface="Arial" panose="020B0604020202020204" pitchFamily="34" charset="0"/>
+              <a:buChar char="•"/>
+            </a:pPr>
+            <a:r>
+              <a:rPr lang="en-US" sz="1200" dirty="0">
+                <a:solidFill>
+                  <a:schemeClr val="accent6"/>
+                </a:solidFill>
+              </a:rPr>
+              <a:t>tissue_type (or cell_line_type)</a:t>
+            </a:r>
+          </a:p>
+          <a:p>
+            <a:pPr marL="171450" indent="-171450">
+              <a:buFont typeface="Arial" panose="020B0604020202020204" pitchFamily="34" charset="0"/>
+              <a:buChar char="•"/>
+            </a:pPr>
+            <a:r>
+              <a:rPr lang="en-US" sz="1200" dirty="0">
+                <a:solidFill>
+                  <a:schemeClr val="accent6"/>
+                </a:solidFill>
+              </a:rPr>
+              <a:t>age or developmental stage (or cell_line_source)</a:t>
+            </a:r>
+          </a:p>
+          <a:p>
+            <a:pPr marL="171450" indent="-171450">
+              <a:buFont typeface="Arial" panose="020B0604020202020204" pitchFamily="34" charset="0"/>
+              <a:buChar char="•"/>
+            </a:pPr>
+            <a:r>
+              <a:rPr lang="en-US" sz="1200" dirty="0">
+                <a:solidFill>
+                  <a:schemeClr val="accent6"/>
+                </a:solidFill>
+              </a:rPr>
+              <a:t>organism_strain (or cell genotype)</a:t>
+            </a:r>
+          </a:p>
+          <a:p>
+            <a:pPr marL="171450" indent="-171450">
+              <a:buFont typeface="Arial" panose="020B0604020202020204" pitchFamily="34" charset="0"/>
+              <a:buChar char="•"/>
+            </a:pPr>
+            <a:r>
+              <a:rPr lang="en-US" sz="1200" dirty="0">
+                <a:solidFill>
+                  <a:schemeClr val="accent6"/>
+                </a:solidFill>
+              </a:rPr>
+              <a:t>gender (or culture_medium)</a:t>
+            </a:r>
+          </a:p>
+        </p:txBody>
+      </p:sp>
+      <p:grpSp>
+        <p:nvGrpSpPr>
+          <p:cNvPr id="84" name="Group 83">
+            <a:extLst>
+              <a:ext uri="{FF2B5EF4-FFF2-40B4-BE49-F238E27FC236}">
+                <a16:creationId xmlns:a16="http://schemas.microsoft.com/office/drawing/2014/main" id="{59F42007-AE6C-469C-8840-84BBD3044C90}"/>
+              </a:ext>
+            </a:extLst>
+          </p:cNvPr>
+          <p:cNvGrpSpPr/>
+          <p:nvPr/>
+        </p:nvGrpSpPr>
+        <p:grpSpPr>
+          <a:xfrm>
+            <a:off x="8169067" y="5285494"/>
+            <a:ext cx="4022933" cy="1569660"/>
+            <a:chOff x="8390988" y="5388614"/>
+            <a:chExt cx="3394710" cy="1569660"/>
+          </a:xfrm>
+        </p:grpSpPr>
+        <p:sp>
+          <p:nvSpPr>
+            <p:cNvPr id="86" name="TextBox 85">
+              <a:extLst>
+                <a:ext uri="{FF2B5EF4-FFF2-40B4-BE49-F238E27FC236}">
+                  <a16:creationId xmlns:a16="http://schemas.microsoft.com/office/drawing/2014/main" id="{641738FF-C2E6-4250-BBAE-FE75DDAE70D5}"/>
+                </a:ext>
+              </a:extLst>
+            </p:cNvPr>
+            <p:cNvSpPr txBox="1"/>
+            <p:nvPr/>
+          </p:nvSpPr>
+          <p:spPr>
+            <a:xfrm>
+              <a:off x="8390988" y="5388614"/>
+              <a:ext cx="3394710" cy="1569660"/>
+            </a:xfrm>
+            <a:prstGeom prst="rect">
+              <a:avLst/>
+            </a:prstGeom>
+            <a:noFill/>
+            <a:ln w="3175">
+              <a:solidFill>
+                <a:schemeClr val="tx1">
+                  <a:lumMod val="50000"/>
+                  <a:lumOff val="50000"/>
+                </a:schemeClr>
+              </a:solidFill>
+            </a:ln>
+          </p:spPr>
+          <p:txBody>
+            <a:bodyPr wrap="square" rtlCol="0">
+              <a:spAutoFit/>
+            </a:bodyPr>
+            <a:lstStyle/>
+            <a:p>
+              <a:r>
+                <a:rPr lang="en-US" sz="1200" u="sng" dirty="0"/>
+                <a:t>Legend:</a:t>
+              </a:r>
+            </a:p>
+            <a:p>
+              <a:r>
+                <a:rPr lang="en-US" sz="1200" b="1" dirty="0"/>
+                <a:t>                  </a:t>
+              </a:r>
+              <a:r>
+                <a:rPr lang="en-US" sz="1200" b="1" dirty="0">
+                  <a:solidFill>
+                    <a:schemeClr val="accent1">
+                      <a:lumMod val="75000"/>
+                    </a:schemeClr>
+                  </a:solidFill>
+                </a:rPr>
+                <a:t>Collection/File name</a:t>
+              </a:r>
+            </a:p>
+            <a:p>
+              <a:r>
+                <a:rPr lang="en-US" sz="1200" dirty="0"/>
+                <a:t>Black: Required metadata</a:t>
+              </a:r>
+            </a:p>
+            <a:p>
+              <a:r>
+                <a:rPr lang="en-US" sz="1200" b="1" dirty="0">
+                  <a:solidFill>
+                    <a:schemeClr val="accent6"/>
+                  </a:solidFill>
+                </a:rPr>
+                <a:t>Green – Optional; can be added later for new projects, may be added at the time of ingestion for retrospective projects</a:t>
+              </a:r>
+            </a:p>
+            <a:p>
+              <a:r>
+                <a:rPr lang="en-US" sz="1200" b="1" dirty="0">
+                  <a:solidFill>
+                    <a:schemeClr val="accent1"/>
+                  </a:solidFill>
+                </a:rPr>
+                <a:t>Blue: Derived metadata  if DME archival workflow is used. Additional metadata may also be derived from the folder structure and folder/file names).</a:t>
+              </a:r>
+            </a:p>
+          </p:txBody>
+        </p:sp>
+        <p:sp>
+          <p:nvSpPr>
+            <p:cNvPr id="87" name="Rounded Rectangle 4">
+              <a:extLst>
+                <a:ext uri="{FF2B5EF4-FFF2-40B4-BE49-F238E27FC236}">
+                  <a16:creationId xmlns:a16="http://schemas.microsoft.com/office/drawing/2014/main" id="{8207D969-8AAE-46CC-8E3F-FECE9662F65D}"/>
+                </a:ext>
+              </a:extLst>
+            </p:cNvPr>
+            <p:cNvSpPr/>
+            <p:nvPr/>
+          </p:nvSpPr>
+          <p:spPr>
+            <a:xfrm>
+              <a:off x="8508281" y="5634289"/>
+              <a:ext cx="355872" cy="156734"/>
+            </a:xfrm>
+            <a:prstGeom prst="roundRect">
+              <a:avLst/>
+            </a:prstGeom>
+            <a:gradFill>
+              <a:gsLst>
+                <a:gs pos="0">
+                  <a:schemeClr val="dk1">
+                    <a:lumMod val="110000"/>
+                    <a:satMod val="105000"/>
+                    <a:tint val="67000"/>
+                  </a:schemeClr>
+                </a:gs>
+                <a:gs pos="17000">
+                  <a:schemeClr val="bg2"/>
+                </a:gs>
+                <a:gs pos="100000">
+                  <a:schemeClr val="accent1"/>
+                </a:gs>
+              </a:gsLst>
+              <a:lin ang="5400000" scaled="0"/>
+            </a:gradFill>
+            <a:ln/>
+          </p:spPr>
+          <p:style>
+            <a:lnRef idx="1">
+              <a:schemeClr val="dk1"/>
+            </a:lnRef>
+            <a:fillRef idx="2">
+              <a:schemeClr val="dk1"/>
+            </a:fillRef>
+            <a:effectRef idx="1">
+              <a:schemeClr val="dk1"/>
+            </a:effectRef>
+            <a:fontRef idx="minor">
+              <a:schemeClr val="dk1"/>
+            </a:fontRef>
+          </p:style>
+          <p:txBody>
+            <a:bodyPr rtlCol="0" anchor="ctr"/>
+            <a:lstStyle/>
+            <a:p>
+              <a:pPr algn="ctr"/>
+              <a:endParaRPr lang="en-US" b="1" dirty="0"/>
+            </a:p>
+          </p:txBody>
+        </p:sp>
+      </p:grpSp>
+      <p:sp>
+        <p:nvSpPr>
+          <p:cNvPr id="33" name="Rounded Rectangle 22">
+            <a:extLst>
+              <a:ext uri="{FF2B5EF4-FFF2-40B4-BE49-F238E27FC236}">
+                <a16:creationId xmlns:a16="http://schemas.microsoft.com/office/drawing/2014/main" id="{511EC16D-C795-46A1-B541-E1CCC243DE26}"/>
+              </a:ext>
+            </a:extLst>
+          </p:cNvPr>
+          <p:cNvSpPr/>
+          <p:nvPr/>
+        </p:nvSpPr>
+        <p:spPr>
+          <a:xfrm>
+            <a:off x="3998551" y="2107400"/>
+            <a:ext cx="1260373" cy="495146"/>
+          </a:xfrm>
+          <a:prstGeom prst="roundRect">
+            <a:avLst/>
+          </a:prstGeom>
+          <a:gradFill>
+            <a:gsLst>
+              <a:gs pos="0">
+                <a:schemeClr val="dk1">
+                  <a:lumMod val="110000"/>
+                  <a:satMod val="105000"/>
+                  <a:tint val="67000"/>
+                </a:schemeClr>
+              </a:gs>
+              <a:gs pos="17000">
+                <a:schemeClr val="bg2"/>
+              </a:gs>
+              <a:gs pos="100000">
+                <a:schemeClr val="accent1"/>
+              </a:gs>
+            </a:gsLst>
+            <a:lin ang="5400000" scaled="0"/>
+          </a:gradFill>
+          <a:ln/>
+        </p:spPr>
+        <p:style>
+          <a:lnRef idx="1">
+            <a:schemeClr val="dk1"/>
+          </a:lnRef>
+          <a:fillRef idx="2">
+            <a:schemeClr val="dk1"/>
+          </a:fillRef>
+          <a:effectRef idx="1">
+            <a:schemeClr val="dk1"/>
+          </a:effectRef>
+          <a:fontRef idx="minor">
+            <a:schemeClr val="dk1"/>
+          </a:fontRef>
+        </p:style>
+        <p:txBody>
+          <a:bodyPr rtlCol="0" anchor="ctr"/>
+          <a:lstStyle/>
+          <a:p>
+            <a:pPr algn="ctr"/>
+            <a:r>
+              <a:rPr lang="en-US" b="1" dirty="0"/>
+              <a:t>Project_X</a:t>
+            </a:r>
+          </a:p>
+        </p:txBody>
+      </p:sp>
       <p:cxnSp>
         <p:nvCxnSpPr>
-          <p:cNvPr id="11" name="Connector: Elbow 10">
-            <a:extLst>
-              <a:ext uri="{FF2B5EF4-FFF2-40B4-BE49-F238E27FC236}">
-                <a16:creationId xmlns:a16="http://schemas.microsoft.com/office/drawing/2014/main" id="{8ED429B5-1AD2-45D9-80A2-D21F551DA537}"/>
+          <p:cNvPr id="20" name="Connector: Elbow 19">
+            <a:extLst>
+              <a:ext uri="{FF2B5EF4-FFF2-40B4-BE49-F238E27FC236}">
+                <a16:creationId xmlns:a16="http://schemas.microsoft.com/office/drawing/2014/main" id="{C210B817-3762-433B-A3D3-EB8FD8A3DF21}"/>
               </a:ext>
             </a:extLst>
           </p:cNvPr>
           <p:cNvCxnSpPr>
-            <a:cxnSpLocks/>
-            <a:stCxn id="5" idx="2"/>
+            <a:stCxn id="28" idx="3"/>
             <a:endCxn id="23" idx="1"/>
           </p:cNvCxnSpPr>
           <p:nvPr/>
         </p:nvCxnSpPr>
         <p:spPr>
-          <a:xfrm rot="16200000" flipH="1">
-            <a:off x="2652276" y="2058054"/>
-            <a:ext cx="494424" cy="1223488"/>
+          <a:xfrm flipV="1">
+            <a:off x="2935112" y="1298083"/>
+            <a:ext cx="1073691" cy="549882"/>
           </a:xfrm>
-          <a:prstGeom prst="bentConnector2">
-            <a:avLst/>
+          <a:prstGeom prst="bentConnector3">
+            <a:avLst>
+              <a:gd name="adj1" fmla="val 65627"/>
+            </a:avLst>
           </a:prstGeom>
           <a:ln>
             <a:tailEnd type="triangle"/>
@@ -5394,26 +5786,290 @@
       </p:cxnSp>
       <p:cxnSp>
         <p:nvCxnSpPr>
-          <p:cNvPr id="35" name="Connector: Elbow 34">
-            <a:extLst>
-              <a:ext uri="{FF2B5EF4-FFF2-40B4-BE49-F238E27FC236}">
-                <a16:creationId xmlns:a16="http://schemas.microsoft.com/office/drawing/2014/main" id="{D54615C4-0F7F-4CD4-A1DA-8D6BCDAC2001}"/>
+          <p:cNvPr id="29" name="Connector: Elbow 28">
+            <a:extLst>
+              <a:ext uri="{FF2B5EF4-FFF2-40B4-BE49-F238E27FC236}">
+                <a16:creationId xmlns:a16="http://schemas.microsoft.com/office/drawing/2014/main" id="{13B81AA2-4F71-4E95-AFC1-6F937FD31CD2}"/>
               </a:ext>
             </a:extLst>
           </p:cNvPr>
           <p:cNvCxnSpPr>
-            <a:stCxn id="23" idx="3"/>
-            <a:endCxn id="22" idx="1"/>
+            <a:stCxn id="28" idx="3"/>
+            <a:endCxn id="33" idx="1"/>
           </p:cNvCxnSpPr>
           <p:nvPr/>
         </p:nvCxnSpPr>
         <p:spPr>
-          <a:xfrm flipV="1">
-            <a:off x="5314976" y="1939920"/>
-            <a:ext cx="712984" cy="977090"/>
+          <a:xfrm>
+            <a:off x="2935112" y="1847965"/>
+            <a:ext cx="1063439" cy="507008"/>
           </a:xfrm>
           <a:prstGeom prst="bentConnector3">
+            <a:avLst>
+              <a:gd name="adj1" fmla="val 65777"/>
+            </a:avLst>
+          </a:prstGeom>
+          <a:ln>
+            <a:tailEnd type="triangle"/>
+          </a:ln>
+        </p:spPr>
+        <p:style>
+          <a:lnRef idx="1">
+            <a:schemeClr val="accent1"/>
+          </a:lnRef>
+          <a:fillRef idx="0">
+            <a:schemeClr val="accent1"/>
+          </a:fillRef>
+          <a:effectRef idx="0">
+            <a:schemeClr val="accent1"/>
+          </a:effectRef>
+          <a:fontRef idx="minor">
+            <a:schemeClr val="tx1"/>
+          </a:fontRef>
+        </p:style>
+      </p:cxnSp>
+      <p:sp>
+        <p:nvSpPr>
+          <p:cNvPr id="41" name="TextBox 40">
+            <a:extLst>
+              <a:ext uri="{FF2B5EF4-FFF2-40B4-BE49-F238E27FC236}">
+                <a16:creationId xmlns:a16="http://schemas.microsoft.com/office/drawing/2014/main" id="{E3881AC7-54A2-4AEE-BDA0-69CEBA956390}"/>
+              </a:ext>
+            </a:extLst>
+          </p:cNvPr>
+          <p:cNvSpPr txBox="1"/>
+          <p:nvPr/>
+        </p:nvSpPr>
+        <p:spPr>
+          <a:xfrm>
+            <a:off x="3639824" y="2710304"/>
+            <a:ext cx="2072042" cy="3231654"/>
+          </a:xfrm>
+          <a:prstGeom prst="rect">
             <a:avLst/>
+          </a:prstGeom>
+          <a:noFill/>
+        </p:spPr>
+        <p:txBody>
+          <a:bodyPr wrap="none" rtlCol="0">
+            <a:spAutoFit/>
+          </a:bodyPr>
+          <a:lstStyle/>
+          <a:p>
+            <a:pPr marL="171450" indent="-171450">
+              <a:buFont typeface="Arial" panose="020B0604020202020204" pitchFamily="34" charset="0"/>
+              <a:buChar char="•"/>
+            </a:pPr>
+            <a:r>
+              <a:rPr lang="en-US" sz="1200" dirty="0"/>
+              <a:t>project_id</a:t>
+            </a:r>
+          </a:p>
+          <a:p>
+            <a:pPr marL="171450" indent="-171450">
+              <a:buFont typeface="Arial" panose="020B0604020202020204" pitchFamily="34" charset="0"/>
+              <a:buChar char="•"/>
+            </a:pPr>
+            <a:r>
+              <a:rPr lang="en-US" sz="1200" dirty="0"/>
+              <a:t>project_title</a:t>
+            </a:r>
+          </a:p>
+          <a:p>
+            <a:pPr marL="171450" indent="-171450">
+              <a:buFont typeface="Arial" panose="020B0604020202020204" pitchFamily="34" charset="0"/>
+              <a:buChar char="•"/>
+            </a:pPr>
+            <a:r>
+              <a:rPr lang="en-US" sz="1200" dirty="0"/>
+              <a:t>project_description</a:t>
+            </a:r>
+          </a:p>
+          <a:p>
+            <a:pPr marL="171450" indent="-171450">
+              <a:buFont typeface="Arial" panose="020B0604020202020204" pitchFamily="34" charset="0"/>
+              <a:buChar char="•"/>
+            </a:pPr>
+            <a:r>
+              <a:rPr lang="en-US" sz="1200" dirty="0"/>
+              <a:t>project_start_date</a:t>
+            </a:r>
+          </a:p>
+          <a:p>
+            <a:pPr marL="171450" indent="-171450">
+              <a:buFont typeface="Arial" panose="020B0604020202020204" pitchFamily="34" charset="0"/>
+              <a:buChar char="•"/>
+            </a:pPr>
+            <a:r>
+              <a:rPr lang="en-US" sz="1200" dirty="0"/>
+              <a:t>project_status</a:t>
+            </a:r>
+          </a:p>
+          <a:p>
+            <a:pPr marL="171450" indent="-171450">
+              <a:buFont typeface="Arial" panose="020B0604020202020204" pitchFamily="34" charset="0"/>
+              <a:buChar char="•"/>
+            </a:pPr>
+            <a:r>
+              <a:rPr lang="en-US" sz="1200" dirty="0"/>
+              <a:t>project_poc</a:t>
+            </a:r>
+          </a:p>
+          <a:p>
+            <a:pPr marL="171450" indent="-171450">
+              <a:buFont typeface="Arial" panose="020B0604020202020204" pitchFamily="34" charset="0"/>
+              <a:buChar char="•"/>
+            </a:pPr>
+            <a:r>
+              <a:rPr lang="en-US" sz="1200" dirty="0"/>
+              <a:t>project_poc_affiliation</a:t>
+            </a:r>
+          </a:p>
+          <a:p>
+            <a:pPr marL="171450" indent="-171450">
+              <a:buFont typeface="Arial" panose="020B0604020202020204" pitchFamily="34" charset="0"/>
+              <a:buChar char="•"/>
+            </a:pPr>
+            <a:r>
+              <a:rPr lang="en-US" sz="1200" dirty="0"/>
+              <a:t>project_poc_email</a:t>
+            </a:r>
+          </a:p>
+          <a:p>
+            <a:pPr marL="171450" indent="-171450">
+              <a:buFont typeface="Arial" panose="020B0604020202020204" pitchFamily="34" charset="0"/>
+              <a:buChar char="•"/>
+            </a:pPr>
+            <a:r>
+              <a:rPr lang="en-US" sz="1200" dirty="0">
+                <a:solidFill>
+                  <a:schemeClr val="accent6"/>
+                </a:solidFill>
+              </a:rPr>
+              <a:t>key_collaborator</a:t>
+            </a:r>
+          </a:p>
+          <a:p>
+            <a:pPr marL="171450" indent="-171450">
+              <a:buFont typeface="Arial" panose="020B0604020202020204" pitchFamily="34" charset="0"/>
+              <a:buChar char="•"/>
+            </a:pPr>
+            <a:r>
+              <a:rPr lang="en-US" sz="1200" dirty="0">
+                <a:solidFill>
+                  <a:schemeClr val="accent6"/>
+                </a:solidFill>
+              </a:rPr>
+              <a:t>key_collaborator_affiliation</a:t>
+            </a:r>
+          </a:p>
+          <a:p>
+            <a:pPr marL="171450" indent="-171450">
+              <a:buFont typeface="Arial" panose="020B0604020202020204" pitchFamily="34" charset="0"/>
+              <a:buChar char="•"/>
+            </a:pPr>
+            <a:r>
+              <a:rPr lang="en-US" sz="1200" dirty="0">
+                <a:solidFill>
+                  <a:schemeClr val="accent6"/>
+                </a:solidFill>
+              </a:rPr>
+              <a:t>key_collaborator_email </a:t>
+            </a:r>
+          </a:p>
+          <a:p>
+            <a:pPr marL="171450" indent="-171450">
+              <a:buFont typeface="Arial" panose="020B0604020202020204" pitchFamily="34" charset="0"/>
+              <a:buChar char="•"/>
+            </a:pPr>
+            <a:r>
+              <a:rPr lang="en-US" sz="1200" dirty="0">
+                <a:solidFill>
+                  <a:schemeClr val="accent6"/>
+                </a:solidFill>
+              </a:rPr>
+              <a:t>study_disease</a:t>
+            </a:r>
+          </a:p>
+          <a:p>
+            <a:pPr marL="171450" indent="-171450">
+              <a:buFont typeface="Arial" panose="020B0604020202020204" pitchFamily="34" charset="0"/>
+              <a:buChar char="•"/>
+            </a:pPr>
+            <a:r>
+              <a:rPr lang="en-US" sz="1200" dirty="0">
+                <a:solidFill>
+                  <a:schemeClr val="accent6"/>
+                </a:solidFill>
+              </a:rPr>
+              <a:t>project_completed_date </a:t>
+            </a:r>
+          </a:p>
+          <a:p>
+            <a:pPr marL="171450" indent="-171450">
+              <a:buFont typeface="Arial" panose="020B0604020202020204" pitchFamily="34" charset="0"/>
+              <a:buChar char="•"/>
+            </a:pPr>
+            <a:r>
+              <a:rPr lang="en-US" sz="1200" dirty="0">
+                <a:solidFill>
+                  <a:schemeClr val="accent6"/>
+                </a:solidFill>
+              </a:rPr>
+              <a:t>public_data_accession_id</a:t>
+            </a:r>
+          </a:p>
+          <a:p>
+            <a:pPr marL="171450" indent="-171450">
+              <a:buFont typeface="Arial" panose="020B0604020202020204" pitchFamily="34" charset="0"/>
+              <a:buChar char="•"/>
+            </a:pPr>
+            <a:r>
+              <a:rPr lang="en-US" sz="1200" dirty="0">
+                <a:solidFill>
+                  <a:schemeClr val="accent6"/>
+                </a:solidFill>
+              </a:rPr>
+              <a:t>pubmed_id</a:t>
+            </a:r>
+          </a:p>
+          <a:p>
+            <a:endParaRPr lang="en-US" sz="1200" dirty="0">
+              <a:solidFill>
+                <a:srgbClr val="FF0000"/>
+              </a:solidFill>
+            </a:endParaRPr>
+          </a:p>
+          <a:p>
+            <a:endParaRPr lang="en-US" sz="1200" dirty="0"/>
+          </a:p>
+        </p:txBody>
+      </p:sp>
+      <p:cxnSp>
+        <p:nvCxnSpPr>
+          <p:cNvPr id="49" name="Connector: Elbow 48">
+            <a:extLst>
+              <a:ext uri="{FF2B5EF4-FFF2-40B4-BE49-F238E27FC236}">
+                <a16:creationId xmlns:a16="http://schemas.microsoft.com/office/drawing/2014/main" id="{8FE47B85-09BC-4FAF-B901-025DFC714BE3}"/>
+              </a:ext>
+            </a:extLst>
+          </p:cNvPr>
+          <p:cNvCxnSpPr>
+            <a:cxnSpLocks/>
+            <a:stCxn id="33" idx="3"/>
+            <a:endCxn id="27" idx="1"/>
+          </p:cNvCxnSpPr>
+          <p:nvPr/>
+        </p:nvCxnSpPr>
+        <p:spPr>
+          <a:xfrm>
+            <a:off x="5258924" y="2354973"/>
+            <a:ext cx="528146" cy="333682"/>
+          </a:xfrm>
+          <a:prstGeom prst="bentConnector3">
+            <a:avLst>
+              <a:gd name="adj1" fmla="val 50000"/>
+            </a:avLst>
           </a:prstGeom>
           <a:ln>
             <a:tailEnd type="triangle"/>
@@ -5436,107 +6092,22 @@
       </p:cxnSp>
       <p:cxnSp>
         <p:nvCxnSpPr>
-          <p:cNvPr id="37" name="Connector: Elbow 36">
-            <a:extLst>
-              <a:ext uri="{FF2B5EF4-FFF2-40B4-BE49-F238E27FC236}">
-                <a16:creationId xmlns:a16="http://schemas.microsoft.com/office/drawing/2014/main" id="{6949DA4A-A080-4A88-ADA4-361CD12F999D}"/>
+          <p:cNvPr id="32" name="Straight Arrow Connector 31">
+            <a:extLst>
+              <a:ext uri="{FF2B5EF4-FFF2-40B4-BE49-F238E27FC236}">
+                <a16:creationId xmlns:a16="http://schemas.microsoft.com/office/drawing/2014/main" id="{FE4C8F6C-EC3B-456A-AE1C-2C200768E314}"/>
               </a:ext>
             </a:extLst>
           </p:cNvPr>
           <p:cNvCxnSpPr>
-            <a:stCxn id="23" idx="3"/>
-            <a:endCxn id="55" idx="1"/>
+            <a:cxnSpLocks/>
           </p:cNvCxnSpPr>
           <p:nvPr/>
         </p:nvCxnSpPr>
         <p:spPr>
           <a:xfrm>
-            <a:off x="5314976" y="2917010"/>
-            <a:ext cx="712985" cy="956146"/>
-          </a:xfrm>
-          <a:prstGeom prst="bentConnector3">
-            <a:avLst/>
-          </a:prstGeom>
-          <a:ln>
-            <a:tailEnd type="triangle"/>
-          </a:ln>
-        </p:spPr>
-        <p:style>
-          <a:lnRef idx="1">
-            <a:schemeClr val="accent1"/>
-          </a:lnRef>
-          <a:fillRef idx="0">
-            <a:schemeClr val="accent1"/>
-          </a:fillRef>
-          <a:effectRef idx="0">
-            <a:schemeClr val="accent1"/>
-          </a:effectRef>
-          <a:fontRef idx="minor">
-            <a:schemeClr val="tx1"/>
-          </a:fontRef>
-        </p:style>
-      </p:cxnSp>
-      <p:cxnSp>
-        <p:nvCxnSpPr>
-          <p:cNvPr id="42" name="Straight Arrow Connector 41">
-            <a:extLst>
-              <a:ext uri="{FF2B5EF4-FFF2-40B4-BE49-F238E27FC236}">
-                <a16:creationId xmlns:a16="http://schemas.microsoft.com/office/drawing/2014/main" id="{35D48699-EAEB-4A50-B204-D2E69C1099F6}"/>
-              </a:ext>
-            </a:extLst>
-          </p:cNvPr>
-          <p:cNvCxnSpPr>
-            <a:cxnSpLocks/>
-            <a:stCxn id="22" idx="3"/>
-            <a:endCxn id="24" idx="1"/>
-          </p:cNvCxnSpPr>
-          <p:nvPr/>
-        </p:nvCxnSpPr>
-        <p:spPr>
-          <a:xfrm>
-            <a:off x="7976647" y="1939920"/>
-            <a:ext cx="1302433" cy="0"/>
-          </a:xfrm>
-          <a:prstGeom prst="straightConnector1">
-            <a:avLst/>
-          </a:prstGeom>
-          <a:ln>
-            <a:tailEnd type="triangle"/>
-          </a:ln>
-        </p:spPr>
-        <p:style>
-          <a:lnRef idx="1">
-            <a:schemeClr val="accent1"/>
-          </a:lnRef>
-          <a:fillRef idx="0">
-            <a:schemeClr val="accent1"/>
-          </a:fillRef>
-          <a:effectRef idx="0">
-            <a:schemeClr val="accent1"/>
-          </a:effectRef>
-          <a:fontRef idx="minor">
-            <a:schemeClr val="tx1"/>
-          </a:fontRef>
-        </p:style>
-      </p:cxnSp>
-      <p:cxnSp>
-        <p:nvCxnSpPr>
-          <p:cNvPr id="45" name="Straight Arrow Connector 44">
-            <a:extLst>
-              <a:ext uri="{FF2B5EF4-FFF2-40B4-BE49-F238E27FC236}">
-                <a16:creationId xmlns:a16="http://schemas.microsoft.com/office/drawing/2014/main" id="{B8BAF335-49AE-447D-9DFD-6550573AB77A}"/>
-              </a:ext>
-            </a:extLst>
-          </p:cNvPr>
-          <p:cNvCxnSpPr>
-            <a:endCxn id="25" idx="1"/>
-          </p:cNvCxnSpPr>
-          <p:nvPr/>
-        </p:nvCxnSpPr>
-        <p:spPr>
-          <a:xfrm flipV="1">
-            <a:off x="8105103" y="3838542"/>
-            <a:ext cx="1229070" cy="1"/>
+            <a:off x="7682205" y="2668511"/>
+            <a:ext cx="1412995" cy="6044"/>
           </a:xfrm>
           <a:prstGeom prst="straightConnector1">
             <a:avLst/>
@@ -5563,7 +6134,7 @@
     </p:spTree>
     <p:extLst>
       <p:ext uri="{BB962C8B-B14F-4D97-AF65-F5344CB8AC3E}">
-        <p14:creationId xmlns:p14="http://schemas.microsoft.com/office/powerpoint/2010/main" val="1981282193"/>
+        <p14:creationId xmlns:p14="http://schemas.microsoft.com/office/powerpoint/2010/main" val="1890992775"/>
       </p:ext>
     </p:extLst>
   </p:cSld>

</xml_diff>